<commit_message>
version 1.1 STOP button added to logic
</commit_message>
<xml_diff>
--- a/ElevatorControl/Elevator presentation.pptx
+++ b/ElevatorControl/Elevator presentation.pptx
@@ -5,7 +5,7 @@
     <p:sldMasterId id="2147483648" r:id="rId4"/>
   </p:sldMasterIdLst>
   <p:notesMasterIdLst>
-    <p:notesMasterId r:id="rId12"/>
+    <p:notesMasterId r:id="rId13"/>
   </p:notesMasterIdLst>
   <p:sldIdLst>
     <p:sldId id="553" r:id="rId5"/>
@@ -15,6 +15,7 @@
     <p:sldId id="558" r:id="rId9"/>
     <p:sldId id="557" r:id="rId10"/>
     <p:sldId id="559" r:id="rId11"/>
+    <p:sldId id="560" r:id="rId12"/>
   </p:sldIdLst>
   <p:sldSz cx="9144000" cy="5143500" type="screen16x9"/>
   <p:notesSz cx="6858000" cy="9144000"/>
@@ -1874,6 +1875,195 @@
     <p:extLst>
       <p:ext uri="{BB962C8B-B14F-4D97-AF65-F5344CB8AC3E}">
         <p14:creationId xmlns:p14="http://schemas.microsoft.com/office/powerpoint/2010/main" val="33362142"/>
+      </p:ext>
+    </p:extLst>
+  </p:cSld>
+  <p:clrMapOvr>
+    <a:masterClrMapping/>
+  </p:clrMapOvr>
+</p:notes>
+</file>
+
+<file path=ppt/notesSlides/notesSlide8.xml><?xml version="1.0" encoding="utf-8"?>
+<p:notes xmlns:a="http://schemas.openxmlformats.org/drawingml/2006/main" xmlns:r="http://schemas.openxmlformats.org/officeDocument/2006/relationships" xmlns:p="http://schemas.openxmlformats.org/presentationml/2006/main" showMasterSp="0" showMasterPhAnim="0">
+  <p:cSld>
+    <p:spTree>
+      <p:nvGrpSpPr>
+        <p:cNvPr id="1" name="Shape 266"/>
+        <p:cNvGrpSpPr/>
+        <p:nvPr/>
+      </p:nvGrpSpPr>
+      <p:grpSpPr>
+        <a:xfrm>
+          <a:off x="0" y="0"/>
+          <a:ext cx="0" cy="0"/>
+          <a:chOff x="0" y="0"/>
+          <a:chExt cx="0" cy="0"/>
+        </a:xfrm>
+      </p:grpSpPr>
+      <p:sp>
+        <p:nvSpPr>
+          <p:cNvPr id="267" name="Shape 267"/>
+          <p:cNvSpPr>
+            <a:spLocks noGrp="1" noRot="1" noChangeAspect="1"/>
+          </p:cNvSpPr>
+          <p:nvPr>
+            <p:ph type="sldImg" idx="2"/>
+          </p:nvPr>
+        </p:nvSpPr>
+        <p:spPr>
+          <a:xfrm>
+            <a:off x="381000" y="685800"/>
+            <a:ext cx="6096000" cy="3429000"/>
+          </a:xfrm>
+          <a:custGeom>
+            <a:avLst/>
+            <a:gdLst/>
+            <a:ahLst/>
+            <a:cxnLst/>
+            <a:rect l="0" t="0" r="0" b="0"/>
+            <a:pathLst>
+              <a:path w="120000" h="120000" extrusionOk="0">
+                <a:moveTo>
+                  <a:pt x="0" y="0"/>
+                </a:moveTo>
+                <a:lnTo>
+                  <a:pt x="120000" y="0"/>
+                </a:lnTo>
+                <a:lnTo>
+                  <a:pt x="120000" y="120000"/>
+                </a:lnTo>
+                <a:lnTo>
+                  <a:pt x="0" y="120000"/>
+                </a:lnTo>
+                <a:close/>
+              </a:path>
+            </a:pathLst>
+          </a:custGeom>
+          <a:noFill/>
+          <a:ln w="12700" cap="flat" cmpd="sng">
+            <a:solidFill>
+              <a:srgbClr val="000000"/>
+            </a:solidFill>
+            <a:prstDash val="solid"/>
+            <a:round/>
+            <a:headEnd type="none" w="med" len="med"/>
+            <a:tailEnd type="none" w="med" len="med"/>
+          </a:ln>
+        </p:spPr>
+      </p:sp>
+      <p:sp>
+        <p:nvSpPr>
+          <p:cNvPr id="268" name="Shape 268"/>
+          <p:cNvSpPr txBox="1">
+            <a:spLocks noGrp="1"/>
+          </p:cNvSpPr>
+          <p:nvPr>
+            <p:ph type="body" idx="1"/>
+          </p:nvPr>
+        </p:nvSpPr>
+        <p:spPr>
+          <a:xfrm>
+            <a:off x="685800" y="4343400"/>
+            <a:ext cx="5486399" cy="4114800"/>
+          </a:xfrm>
+          <a:prstGeom prst="rect">
+            <a:avLst/>
+          </a:prstGeom>
+          <a:noFill/>
+          <a:ln>
+            <a:noFill/>
+          </a:ln>
+        </p:spPr>
+        <p:txBody>
+          <a:bodyPr lIns="91425" tIns="45700" rIns="91425" bIns="45700" anchor="t" anchorCtr="0">
+            <a:noAutofit/>
+          </a:bodyPr>
+          <a:lstStyle/>
+          <a:p>
+            <a:pPr marL="0" marR="0" lvl="0" indent="0" algn="l" rtl="0">
+              <a:spcBef>
+                <a:spcPts val="0"/>
+              </a:spcBef>
+              <a:buSzPct val="25000"/>
+              <a:buNone/>
+            </a:pPr>
+            <a:endParaRPr sz="1200" b="0" i="0" u="none" strike="noStrike" cap="none" dirty="0">
+              <a:solidFill>
+                <a:schemeClr val="dk1"/>
+              </a:solidFill>
+              <a:latin typeface="Calibri"/>
+              <a:ea typeface="Calibri"/>
+              <a:cs typeface="Calibri"/>
+              <a:sym typeface="Calibri"/>
+            </a:endParaRPr>
+          </a:p>
+        </p:txBody>
+      </p:sp>
+      <p:sp>
+        <p:nvSpPr>
+          <p:cNvPr id="269" name="Shape 269"/>
+          <p:cNvSpPr txBox="1">
+            <a:spLocks noGrp="1"/>
+          </p:cNvSpPr>
+          <p:nvPr>
+            <p:ph type="sldNum" idx="12"/>
+          </p:nvPr>
+        </p:nvSpPr>
+        <p:spPr>
+          <a:xfrm>
+            <a:off x="3884612" y="8685213"/>
+            <a:ext cx="2971799" cy="457200"/>
+          </a:xfrm>
+          <a:prstGeom prst="rect">
+            <a:avLst/>
+          </a:prstGeom>
+          <a:noFill/>
+          <a:ln>
+            <a:noFill/>
+          </a:ln>
+        </p:spPr>
+        <p:txBody>
+          <a:bodyPr lIns="91425" tIns="45700" rIns="91425" bIns="45700" anchor="b" anchorCtr="0">
+            <a:noAutofit/>
+          </a:bodyPr>
+          <a:lstStyle/>
+          <a:p>
+            <a:pPr marL="0" marR="0" lvl="0" indent="0" algn="r" rtl="0">
+              <a:spcBef>
+                <a:spcPts val="0"/>
+              </a:spcBef>
+              <a:buSzPct val="25000"/>
+              <a:buNone/>
+            </a:pPr>
+            <a:fld id="{00000000-1234-1234-1234-123412341234}" type="slidenum">
+              <a:rPr lang="en-GB" sz="1200" b="0" i="0" u="none" strike="noStrike" cap="none">
+                <a:solidFill>
+                  <a:schemeClr val="dk1"/>
+                </a:solidFill>
+                <a:latin typeface="Calibri"/>
+                <a:ea typeface="Calibri"/>
+                <a:cs typeface="Calibri"/>
+                <a:sym typeface="Calibri"/>
+              </a:rPr>
+              <a:t>8</a:t>
+            </a:fld>
+            <a:endParaRPr lang="en-GB" sz="1200" b="0" i="0" u="none" strike="noStrike" cap="none">
+              <a:solidFill>
+                <a:schemeClr val="dk1"/>
+              </a:solidFill>
+              <a:latin typeface="Calibri"/>
+              <a:ea typeface="Calibri"/>
+              <a:cs typeface="Calibri"/>
+              <a:sym typeface="Calibri"/>
+            </a:endParaRPr>
+          </a:p>
+        </p:txBody>
+      </p:sp>
+    </p:spTree>
+    <p:extLst>
+      <p:ext uri="{BB962C8B-B14F-4D97-AF65-F5344CB8AC3E}">
+        <p14:creationId xmlns:p14="http://schemas.microsoft.com/office/powerpoint/2010/main" val="3966043425"/>
       </p:ext>
     </p:extLst>
   </p:cSld>
@@ -5228,7 +5418,7 @@
       </p:sp>
       <p:pic>
         <p:nvPicPr>
-          <p:cNvPr id="6" name="Рисунок 5"/>
+          <p:cNvPr id="2" name="Рисунок 1"/>
           <p:cNvPicPr>
             <a:picLocks noChangeAspect="1"/>
           </p:cNvPicPr>
@@ -5242,8 +5432,8 @@
         </p:blipFill>
         <p:spPr>
           <a:xfrm>
-            <a:off x="527124" y="1180690"/>
-            <a:ext cx="8252138" cy="3496233"/>
+            <a:off x="363686" y="1082558"/>
+            <a:ext cx="8414554" cy="3594365"/>
           </a:xfrm>
           <a:prstGeom prst="rect">
             <a:avLst/>
@@ -5435,7 +5625,7 @@
         <p:spPr>
           <a:xfrm>
             <a:off x="24213" y="886275"/>
-            <a:ext cx="1665897" cy="3042073"/>
+            <a:ext cx="1665897" cy="2889659"/>
           </a:xfrm>
           <a:prstGeom prst="rect">
             <a:avLst/>
@@ -5469,6 +5659,1232 @@
               <a:t>Power On / Initialization</a:t>
             </a:r>
             <a:endParaRPr lang="uk-UA" sz="1000" b="1"/>
+          </a:p>
+        </p:txBody>
+      </p:sp>
+      <p:sp>
+        <p:nvSpPr>
+          <p:cNvPr id="12" name="TextBox 11"/>
+          <p:cNvSpPr txBox="1"/>
+          <p:nvPr/>
+        </p:nvSpPr>
+        <p:spPr>
+          <a:xfrm>
+            <a:off x="1758004" y="640053"/>
+            <a:ext cx="2197385" cy="246221"/>
+          </a:xfrm>
+          <a:prstGeom prst="rect">
+            <a:avLst/>
+          </a:prstGeom>
+          <a:noFill/>
+        </p:spPr>
+        <p:txBody>
+          <a:bodyPr wrap="square" rtlCol="0">
+            <a:spAutoFit/>
+          </a:bodyPr>
+          <a:lstStyle/>
+          <a:p>
+            <a:r>
+              <a:rPr lang="en-US" sz="1000" b="1" smtClean="0"/>
+              <a:t>Moving Up from 1st to 2nd</a:t>
+            </a:r>
+            <a:endParaRPr lang="uk-UA" sz="1000" b="1"/>
+          </a:p>
+        </p:txBody>
+      </p:sp>
+      <p:sp>
+        <p:nvSpPr>
+          <p:cNvPr id="13" name="TextBox 12"/>
+          <p:cNvSpPr txBox="1"/>
+          <p:nvPr/>
+        </p:nvSpPr>
+        <p:spPr>
+          <a:xfrm>
+            <a:off x="3536889" y="640053"/>
+            <a:ext cx="2197385" cy="246221"/>
+          </a:xfrm>
+          <a:prstGeom prst="rect">
+            <a:avLst/>
+          </a:prstGeom>
+          <a:noFill/>
+        </p:spPr>
+        <p:txBody>
+          <a:bodyPr wrap="square" rtlCol="0">
+            <a:spAutoFit/>
+          </a:bodyPr>
+          <a:lstStyle/>
+          <a:p>
+            <a:r>
+              <a:rPr lang="en-US" sz="1000" b="1" smtClean="0"/>
+              <a:t>Moving Up from 1st to 3rd</a:t>
+            </a:r>
+            <a:endParaRPr lang="uk-UA" sz="1000" b="1"/>
+          </a:p>
+        </p:txBody>
+      </p:sp>
+      <p:sp>
+        <p:nvSpPr>
+          <p:cNvPr id="14" name="TextBox 13"/>
+          <p:cNvSpPr txBox="1"/>
+          <p:nvPr/>
+        </p:nvSpPr>
+        <p:spPr>
+          <a:xfrm>
+            <a:off x="5270680" y="628358"/>
+            <a:ext cx="2197385" cy="246221"/>
+          </a:xfrm>
+          <a:prstGeom prst="rect">
+            <a:avLst/>
+          </a:prstGeom>
+          <a:noFill/>
+        </p:spPr>
+        <p:txBody>
+          <a:bodyPr wrap="square" rtlCol="0">
+            <a:spAutoFit/>
+          </a:bodyPr>
+          <a:lstStyle/>
+          <a:p>
+            <a:r>
+              <a:rPr lang="en-US" sz="1000" b="1" smtClean="0"/>
+              <a:t>Moving Down from 3rd to 2nd</a:t>
+            </a:r>
+            <a:endParaRPr lang="uk-UA" sz="1000" b="1"/>
+          </a:p>
+        </p:txBody>
+      </p:sp>
+      <p:sp>
+        <p:nvSpPr>
+          <p:cNvPr id="15" name="TextBox 14"/>
+          <p:cNvSpPr txBox="1"/>
+          <p:nvPr/>
+        </p:nvSpPr>
+        <p:spPr>
+          <a:xfrm>
+            <a:off x="7190604" y="640053"/>
+            <a:ext cx="2197385" cy="246221"/>
+          </a:xfrm>
+          <a:prstGeom prst="rect">
+            <a:avLst/>
+          </a:prstGeom>
+          <a:noFill/>
+        </p:spPr>
+        <p:txBody>
+          <a:bodyPr wrap="square" rtlCol="0">
+            <a:spAutoFit/>
+          </a:bodyPr>
+          <a:lstStyle/>
+          <a:p>
+            <a:r>
+              <a:rPr lang="en-US" sz="1000" b="1" smtClean="0"/>
+              <a:t>Moving Down from 3rd to 2nd</a:t>
+            </a:r>
+            <a:endParaRPr lang="uk-UA" sz="1000" b="1"/>
+          </a:p>
+        </p:txBody>
+      </p:sp>
+      <p:sp>
+        <p:nvSpPr>
+          <p:cNvPr id="16" name="TextBox 15"/>
+          <p:cNvSpPr txBox="1"/>
+          <p:nvPr/>
+        </p:nvSpPr>
+        <p:spPr>
+          <a:xfrm>
+            <a:off x="-19951" y="3769385"/>
+            <a:ext cx="3141233" cy="707886"/>
+          </a:xfrm>
+          <a:prstGeom prst="rect">
+            <a:avLst/>
+          </a:prstGeom>
+          <a:noFill/>
+        </p:spPr>
+        <p:txBody>
+          <a:bodyPr wrap="square" rtlCol="0">
+            <a:spAutoFit/>
+          </a:bodyPr>
+          <a:lstStyle/>
+          <a:p>
+            <a:r>
+              <a:rPr lang="en-US" sz="1000" b="1" smtClean="0"/>
+              <a:t>Door switches:</a:t>
+            </a:r>
+          </a:p>
+          <a:p>
+            <a:pPr marL="171450" indent="-171450">
+              <a:buFont typeface="Arial" panose="020B0604020202020204" pitchFamily="34" charset="0"/>
+              <a:buChar char="•"/>
+            </a:pPr>
+            <a:r>
+              <a:rPr lang="en-US" sz="1000" smtClean="0"/>
+              <a:t>Closed = 1  </a:t>
+            </a:r>
+          </a:p>
+          <a:p>
+            <a:pPr marL="171450" indent="-171450">
+              <a:buFont typeface="Arial" panose="020B0604020202020204" pitchFamily="34" charset="0"/>
+              <a:buChar char="•"/>
+            </a:pPr>
+            <a:r>
+              <a:rPr lang="en-US" sz="1000"/>
+              <a:t>O</a:t>
+            </a:r>
+            <a:r>
+              <a:rPr lang="en-US" sz="1000" smtClean="0"/>
+              <a:t>pened = 2</a:t>
+            </a:r>
+          </a:p>
+          <a:p>
+            <a:pPr marL="171450" indent="-171450">
+              <a:buFont typeface="Arial" panose="020B0604020202020204" pitchFamily="34" charset="0"/>
+              <a:buChar char="•"/>
+            </a:pPr>
+            <a:endParaRPr lang="uk-UA" sz="1000" b="1"/>
+          </a:p>
+        </p:txBody>
+      </p:sp>
+      <p:sp>
+        <p:nvSpPr>
+          <p:cNvPr id="17" name="TextBox 16"/>
+          <p:cNvSpPr txBox="1"/>
+          <p:nvPr/>
+        </p:nvSpPr>
+        <p:spPr>
+          <a:xfrm>
+            <a:off x="977745" y="3769385"/>
+            <a:ext cx="3141233" cy="1323439"/>
+          </a:xfrm>
+          <a:prstGeom prst="rect">
+            <a:avLst/>
+          </a:prstGeom>
+          <a:noFill/>
+        </p:spPr>
+        <p:txBody>
+          <a:bodyPr wrap="square" rtlCol="0">
+            <a:spAutoFit/>
+          </a:bodyPr>
+          <a:lstStyle/>
+          <a:p>
+            <a:r>
+              <a:rPr lang="en-US" sz="1000" b="1" smtClean="0"/>
+              <a:t>Cabin switches:</a:t>
+            </a:r>
+          </a:p>
+          <a:p>
+            <a:pPr marL="171450" indent="-171450">
+              <a:buFont typeface="Arial" panose="020B0604020202020204" pitchFamily="34" charset="0"/>
+              <a:buChar char="•"/>
+            </a:pPr>
+            <a:r>
+              <a:rPr lang="en-US" sz="1000" smtClean="0"/>
+              <a:t>Max </a:t>
+            </a:r>
+            <a:r>
+              <a:rPr lang="en-US" sz="1000" smtClean="0"/>
+              <a:t>   =  </a:t>
+            </a:r>
+            <a:r>
+              <a:rPr lang="en-US" sz="1000" smtClean="0"/>
+              <a:t>5</a:t>
+            </a:r>
+          </a:p>
+          <a:p>
+            <a:pPr marL="171450" indent="-171450">
+              <a:buFont typeface="Arial" panose="020B0604020202020204" pitchFamily="34" charset="0"/>
+              <a:buChar char="•"/>
+            </a:pPr>
+            <a:r>
+              <a:rPr lang="en-US" sz="1000" smtClean="0"/>
+              <a:t>Low </a:t>
+            </a:r>
+            <a:r>
+              <a:rPr lang="en-US" sz="1000" smtClean="0"/>
+              <a:t>   = </a:t>
+            </a:r>
+            <a:r>
+              <a:rPr lang="en-US" sz="1000" smtClean="0"/>
+              <a:t>4</a:t>
+            </a:r>
+          </a:p>
+          <a:p>
+            <a:pPr marL="171450" indent="-171450">
+              <a:buFont typeface="Arial" panose="020B0604020202020204" pitchFamily="34" charset="0"/>
+              <a:buChar char="•"/>
+            </a:pPr>
+            <a:r>
+              <a:rPr lang="en-US" sz="1000" smtClean="0"/>
+              <a:t>Floor  = </a:t>
+            </a:r>
+            <a:r>
+              <a:rPr lang="en-US" sz="1000" smtClean="0"/>
+              <a:t>3</a:t>
+            </a:r>
+          </a:p>
+          <a:p>
+            <a:pPr marL="171450" indent="-171450">
+              <a:buFont typeface="Arial" panose="020B0604020202020204" pitchFamily="34" charset="0"/>
+              <a:buChar char="•"/>
+            </a:pPr>
+            <a:r>
+              <a:rPr lang="en-US" sz="1000"/>
+              <a:t>High </a:t>
+            </a:r>
+            <a:r>
+              <a:rPr lang="en-US" sz="1000" smtClean="0"/>
+              <a:t>  = </a:t>
+            </a:r>
+            <a:r>
+              <a:rPr lang="en-US" sz="1000" smtClean="0"/>
+              <a:t>2</a:t>
+            </a:r>
+          </a:p>
+          <a:p>
+            <a:pPr marL="171450" indent="-171450">
+              <a:buFont typeface="Arial" panose="020B0604020202020204" pitchFamily="34" charset="0"/>
+              <a:buChar char="•"/>
+            </a:pPr>
+            <a:r>
+              <a:rPr lang="en-US" sz="1000" smtClean="0"/>
+              <a:t>Min     </a:t>
+            </a:r>
+            <a:r>
+              <a:rPr lang="en-US" sz="1000" smtClean="0"/>
+              <a:t>= </a:t>
+            </a:r>
+            <a:r>
+              <a:rPr lang="en-US" sz="1000" smtClean="0"/>
+              <a:t>1</a:t>
+            </a:r>
+          </a:p>
+          <a:p>
+            <a:pPr marL="171450" indent="-171450">
+              <a:buFont typeface="Arial" panose="020B0604020202020204" pitchFamily="34" charset="0"/>
+              <a:buChar char="•"/>
+            </a:pPr>
+            <a:r>
+              <a:rPr lang="en-US" sz="1000" smtClean="0"/>
+              <a:t>No     = 0</a:t>
+            </a:r>
+            <a:endParaRPr lang="en-US" sz="1000" smtClean="0"/>
+          </a:p>
+          <a:p>
+            <a:pPr marL="171450" indent="-171450">
+              <a:buFont typeface="Arial" panose="020B0604020202020204" pitchFamily="34" charset="0"/>
+              <a:buChar char="•"/>
+            </a:pPr>
+            <a:endParaRPr lang="uk-UA" sz="1000" b="1"/>
+          </a:p>
+        </p:txBody>
+      </p:sp>
+      <p:sp>
+        <p:nvSpPr>
+          <p:cNvPr id="18" name="TextBox 17"/>
+          <p:cNvSpPr txBox="1"/>
+          <p:nvPr/>
+        </p:nvSpPr>
+        <p:spPr>
+          <a:xfrm>
+            <a:off x="2043817" y="3746349"/>
+            <a:ext cx="3141233" cy="1631216"/>
+          </a:xfrm>
+          <a:prstGeom prst="rect">
+            <a:avLst/>
+          </a:prstGeom>
+          <a:noFill/>
+        </p:spPr>
+        <p:txBody>
+          <a:bodyPr wrap="square" rtlCol="0">
+            <a:spAutoFit/>
+          </a:bodyPr>
+          <a:lstStyle/>
+          <a:p>
+            <a:r>
+              <a:rPr lang="en-US" sz="1000" b="1" smtClean="0"/>
+              <a:t>Keys:</a:t>
+            </a:r>
+          </a:p>
+          <a:p>
+            <a:pPr marL="171450" indent="-171450">
+              <a:buFont typeface="Arial" panose="020B0604020202020204" pitchFamily="34" charset="0"/>
+              <a:buChar char="•"/>
+            </a:pPr>
+            <a:r>
+              <a:rPr lang="en-US" sz="1000" smtClean="0"/>
+              <a:t>Outcabin floor 3 =  -3</a:t>
+            </a:r>
+          </a:p>
+          <a:p>
+            <a:pPr marL="171450" indent="-171450">
+              <a:buFont typeface="Arial" panose="020B0604020202020204" pitchFamily="34" charset="0"/>
+              <a:buChar char="•"/>
+            </a:pPr>
+            <a:r>
+              <a:rPr lang="en-US" sz="1000"/>
+              <a:t>Outcabin floor </a:t>
+            </a:r>
+            <a:r>
+              <a:rPr lang="en-US" sz="1000" smtClean="0"/>
+              <a:t>2 </a:t>
+            </a:r>
+            <a:r>
+              <a:rPr lang="en-US" sz="1000"/>
+              <a:t>= </a:t>
+            </a:r>
+            <a:r>
+              <a:rPr lang="en-US" sz="1000" smtClean="0"/>
+              <a:t> -2</a:t>
+            </a:r>
+            <a:endParaRPr lang="en-US" sz="1000"/>
+          </a:p>
+          <a:p>
+            <a:pPr marL="171450" indent="-171450">
+              <a:buFont typeface="Arial" panose="020B0604020202020204" pitchFamily="34" charset="0"/>
+              <a:buChar char="•"/>
+            </a:pPr>
+            <a:r>
+              <a:rPr lang="en-US" sz="1000"/>
+              <a:t>Outcabin floor </a:t>
+            </a:r>
+            <a:r>
+              <a:rPr lang="en-US" sz="1000" smtClean="0"/>
+              <a:t>1 </a:t>
+            </a:r>
+            <a:r>
+              <a:rPr lang="en-US" sz="1000"/>
+              <a:t>= </a:t>
+            </a:r>
+            <a:r>
+              <a:rPr lang="en-US" sz="1000" smtClean="0"/>
+              <a:t> -</a:t>
+            </a:r>
+            <a:r>
+              <a:rPr lang="en-US" sz="1000" smtClean="0"/>
+              <a:t>1</a:t>
+            </a:r>
+          </a:p>
+          <a:p>
+            <a:pPr marL="171450" indent="-171450">
+              <a:buFont typeface="Arial" panose="020B0604020202020204" pitchFamily="34" charset="0"/>
+              <a:buChar char="•"/>
+            </a:pPr>
+            <a:r>
+              <a:rPr lang="en-US" sz="1000" smtClean="0"/>
+              <a:t>Not pressed       =  0</a:t>
+            </a:r>
+            <a:endParaRPr lang="en-US" sz="1000"/>
+          </a:p>
+          <a:p>
+            <a:pPr marL="171450" indent="-171450">
+              <a:buFont typeface="Arial" panose="020B0604020202020204" pitchFamily="34" charset="0"/>
+              <a:buChar char="•"/>
+            </a:pPr>
+            <a:r>
+              <a:rPr lang="en-US" sz="1000"/>
+              <a:t>Outcabin floor </a:t>
+            </a:r>
+            <a:r>
+              <a:rPr lang="en-US" sz="1000" smtClean="0"/>
+              <a:t>1 </a:t>
+            </a:r>
+            <a:r>
+              <a:rPr lang="en-US" sz="1000"/>
+              <a:t>=  1</a:t>
+            </a:r>
+          </a:p>
+          <a:p>
+            <a:pPr marL="171450" indent="-171450">
+              <a:buFont typeface="Arial" panose="020B0604020202020204" pitchFamily="34" charset="0"/>
+              <a:buChar char="•"/>
+            </a:pPr>
+            <a:r>
+              <a:rPr lang="en-US" sz="1000"/>
+              <a:t>Outcabin floor 2 =  </a:t>
+            </a:r>
+            <a:r>
+              <a:rPr lang="en-US" sz="1000" smtClean="0"/>
+              <a:t>2</a:t>
+            </a:r>
+            <a:endParaRPr lang="en-US" sz="1000"/>
+          </a:p>
+          <a:p>
+            <a:pPr marL="171450" indent="-171450">
+              <a:buFont typeface="Arial" panose="020B0604020202020204" pitchFamily="34" charset="0"/>
+              <a:buChar char="•"/>
+            </a:pPr>
+            <a:r>
+              <a:rPr lang="en-US" sz="1000"/>
+              <a:t>Outcabin floor </a:t>
+            </a:r>
+            <a:r>
+              <a:rPr lang="en-US" sz="1000" smtClean="0"/>
+              <a:t>3 </a:t>
+            </a:r>
+            <a:r>
+              <a:rPr lang="en-US" sz="1000"/>
+              <a:t>=  </a:t>
+            </a:r>
+            <a:r>
+              <a:rPr lang="en-US" sz="1000" smtClean="0"/>
+              <a:t>3</a:t>
+            </a:r>
+          </a:p>
+          <a:p>
+            <a:pPr marL="171450" indent="-171450">
+              <a:buFont typeface="Arial" panose="020B0604020202020204" pitchFamily="34" charset="0"/>
+              <a:buChar char="•"/>
+            </a:pPr>
+            <a:r>
+              <a:rPr lang="en-US" sz="1000" smtClean="0"/>
+              <a:t>Stop  = 4</a:t>
+            </a:r>
+            <a:endParaRPr lang="en-US" sz="1000"/>
+          </a:p>
+          <a:p>
+            <a:pPr marL="171450" indent="-171450">
+              <a:buFont typeface="Arial" panose="020B0604020202020204" pitchFamily="34" charset="0"/>
+              <a:buChar char="•"/>
+            </a:pPr>
+            <a:endParaRPr lang="uk-UA" sz="1000" b="1"/>
+          </a:p>
+        </p:txBody>
+      </p:sp>
+      <p:pic>
+        <p:nvPicPr>
+          <p:cNvPr id="4" name="Рисунок 3"/>
+          <p:cNvPicPr>
+            <a:picLocks noChangeAspect="1"/>
+          </p:cNvPicPr>
+          <p:nvPr/>
+        </p:nvPicPr>
+        <p:blipFill>
+          <a:blip r:embed="rId4"/>
+          <a:stretch>
+            <a:fillRect/>
+          </a:stretch>
+        </p:blipFill>
+        <p:spPr>
+          <a:xfrm>
+            <a:off x="5423092" y="886274"/>
+            <a:ext cx="1578940" cy="2897523"/>
+          </a:xfrm>
+          <a:prstGeom prst="rect">
+            <a:avLst/>
+          </a:prstGeom>
+        </p:spPr>
+      </p:pic>
+      <p:pic>
+        <p:nvPicPr>
+          <p:cNvPr id="6" name="Рисунок 5"/>
+          <p:cNvPicPr>
+            <a:picLocks noChangeAspect="1"/>
+          </p:cNvPicPr>
+          <p:nvPr/>
+        </p:nvPicPr>
+        <p:blipFill>
+          <a:blip r:embed="rId5"/>
+          <a:stretch>
+            <a:fillRect/>
+          </a:stretch>
+        </p:blipFill>
+        <p:spPr>
+          <a:xfrm>
+            <a:off x="1864313" y="894757"/>
+            <a:ext cx="1575918" cy="2903458"/>
+          </a:xfrm>
+          <a:prstGeom prst="rect">
+            <a:avLst/>
+          </a:prstGeom>
+        </p:spPr>
+      </p:pic>
+      <p:pic>
+        <p:nvPicPr>
+          <p:cNvPr id="11" name="Рисунок 10"/>
+          <p:cNvPicPr>
+            <a:picLocks noChangeAspect="1"/>
+          </p:cNvPicPr>
+          <p:nvPr/>
+        </p:nvPicPr>
+        <p:blipFill>
+          <a:blip r:embed="rId6"/>
+          <a:stretch>
+            <a:fillRect/>
+          </a:stretch>
+        </p:blipFill>
+        <p:spPr>
+          <a:xfrm>
+            <a:off x="3637851" y="886274"/>
+            <a:ext cx="1632829" cy="4134871"/>
+          </a:xfrm>
+          <a:prstGeom prst="rect">
+            <a:avLst/>
+          </a:prstGeom>
+        </p:spPr>
+      </p:pic>
+      <p:pic>
+        <p:nvPicPr>
+          <p:cNvPr id="19" name="Рисунок 18"/>
+          <p:cNvPicPr>
+            <a:picLocks noChangeAspect="1"/>
+          </p:cNvPicPr>
+          <p:nvPr/>
+        </p:nvPicPr>
+        <p:blipFill>
+          <a:blip r:embed="rId7"/>
+          <a:stretch>
+            <a:fillRect/>
+          </a:stretch>
+        </p:blipFill>
+        <p:spPr>
+          <a:xfrm>
+            <a:off x="7468065" y="883016"/>
+            <a:ext cx="1417409" cy="4189988"/>
+          </a:xfrm>
+          <a:prstGeom prst="rect">
+            <a:avLst/>
+          </a:prstGeom>
+        </p:spPr>
+      </p:pic>
+    </p:spTree>
+    <p:extLst>
+      <p:ext uri="{BB962C8B-B14F-4D97-AF65-F5344CB8AC3E}">
+        <p14:creationId xmlns:p14="http://schemas.microsoft.com/office/powerpoint/2010/main" val="2368913712"/>
+      </p:ext>
+    </p:extLst>
+  </p:cSld>
+  <p:clrMapOvr>
+    <a:masterClrMapping/>
+  </p:clrMapOvr>
+  <p:timing>
+    <p:tnLst>
+      <p:par>
+        <p:cTn id="1" dur="indefinite" restart="never" nodeType="tmRoot"/>
+      </p:par>
+    </p:tnLst>
+  </p:timing>
+</p:sld>
+</file>
+
+<file path=ppt/slides/slide8.xml><?xml version="1.0" encoding="utf-8"?>
+<p:sld xmlns:a="http://schemas.openxmlformats.org/drawingml/2006/main" xmlns:r="http://schemas.openxmlformats.org/officeDocument/2006/relationships" xmlns:p="http://schemas.openxmlformats.org/presentationml/2006/main">
+  <p:cSld>
+    <p:spTree>
+      <p:nvGrpSpPr>
+        <p:cNvPr id="1" name="Shape 270"/>
+        <p:cNvGrpSpPr/>
+        <p:nvPr/>
+      </p:nvGrpSpPr>
+      <p:grpSpPr>
+        <a:xfrm>
+          <a:off x="0" y="0"/>
+          <a:ext cx="0" cy="0"/>
+          <a:chOff x="0" y="0"/>
+          <a:chExt cx="0" cy="0"/>
+        </a:xfrm>
+      </p:grpSpPr>
+      <p:sp>
+        <p:nvSpPr>
+          <p:cNvPr id="271" name="Shape 271"/>
+          <p:cNvSpPr txBox="1">
+            <a:spLocks noGrp="1"/>
+          </p:cNvSpPr>
+          <p:nvPr>
+            <p:ph type="title"/>
+          </p:nvPr>
+        </p:nvSpPr>
+        <p:spPr>
+          <a:xfrm>
+            <a:off x="223837" y="75305"/>
+            <a:ext cx="6629400" cy="537882"/>
+          </a:xfrm>
+          <a:prstGeom prst="rect">
+            <a:avLst/>
+          </a:prstGeom>
+          <a:noFill/>
+          <a:ln>
+            <a:noFill/>
+          </a:ln>
+        </p:spPr>
+        <p:txBody>
+          <a:bodyPr lIns="0" tIns="0" rIns="0" bIns="0" anchor="t" anchorCtr="0">
+            <a:noAutofit/>
+          </a:bodyPr>
+          <a:lstStyle/>
+          <a:p>
+            <a:pPr lvl="0">
+              <a:buSzPct val="25000"/>
+            </a:pPr>
+            <a:r>
+              <a:rPr lang="en-GB" sz="1800" b="1" i="0" u="none" strike="noStrike" cap="none" smtClean="0">
+                <a:solidFill>
+                  <a:schemeClr val="dk1"/>
+                </a:solidFill>
+                <a:latin typeface="Arial"/>
+                <a:ea typeface="Arial"/>
+                <a:cs typeface="Arial"/>
+                <a:sym typeface="Arial"/>
+              </a:rPr>
+              <a:t/>
+            </a:r>
+            <a:br>
+              <a:rPr lang="en-GB" sz="1800" b="1" i="0" u="none" strike="noStrike" cap="none" smtClean="0">
+                <a:solidFill>
+                  <a:schemeClr val="dk1"/>
+                </a:solidFill>
+                <a:latin typeface="Arial"/>
+                <a:ea typeface="Arial"/>
+                <a:cs typeface="Arial"/>
+                <a:sym typeface="Arial"/>
+              </a:rPr>
+            </a:br>
+            <a:r>
+              <a:rPr lang="en-GB" b="0" smtClean="0"/>
+              <a:t>SIMULATION DRIVERS LEVEL WITH SCANF</a:t>
+            </a:r>
+            <a:endParaRPr lang="en-GB" sz="1800" b="0" i="0" u="none" strike="noStrike" cap="none" dirty="0">
+              <a:solidFill>
+                <a:schemeClr val="dk1"/>
+              </a:solidFill>
+              <a:latin typeface="Arial"/>
+              <a:ea typeface="Arial"/>
+              <a:cs typeface="Arial"/>
+              <a:sym typeface="Arial"/>
+            </a:endParaRPr>
+          </a:p>
+        </p:txBody>
+      </p:sp>
+      <p:sp>
+        <p:nvSpPr>
+          <p:cNvPr id="273" name="Shape 273"/>
+          <p:cNvSpPr txBox="1">
+            <a:spLocks noGrp="1"/>
+          </p:cNvSpPr>
+          <p:nvPr>
+            <p:ph type="sldNum" idx="12"/>
+          </p:nvPr>
+        </p:nvSpPr>
+        <p:spPr>
+          <a:xfrm>
+            <a:off x="8197703" y="4676923"/>
+            <a:ext cx="722460" cy="396081"/>
+          </a:xfrm>
+          <a:prstGeom prst="rect">
+            <a:avLst/>
+          </a:prstGeom>
+          <a:noFill/>
+          <a:ln>
+            <a:noFill/>
+          </a:ln>
+        </p:spPr>
+        <p:txBody>
+          <a:bodyPr lIns="0" tIns="0" rIns="0" bIns="0" anchor="b" anchorCtr="0">
+            <a:noAutofit/>
+          </a:bodyPr>
+          <a:lstStyle/>
+          <a:p>
+            <a:pPr marL="0" marR="0" lvl="0" indent="0" algn="r" rtl="0">
+              <a:spcBef>
+                <a:spcPts val="0"/>
+              </a:spcBef>
+              <a:buSzPct val="25000"/>
+              <a:buNone/>
+            </a:pPr>
+            <a:fld id="{00000000-1234-1234-1234-123412341234}" type="slidenum">
+              <a:rPr lang="en-GB" sz="700" b="0" i="0" u="none" strike="noStrike" cap="none">
+                <a:solidFill>
+                  <a:schemeClr val="dk1"/>
+                </a:solidFill>
+                <a:latin typeface="Arial"/>
+                <a:ea typeface="Arial"/>
+                <a:cs typeface="Arial"/>
+                <a:sym typeface="Arial"/>
+              </a:rPr>
+              <a:t>8</a:t>
+            </a:fld>
+            <a:endParaRPr lang="en-GB" sz="700" b="0" i="0" u="none" strike="noStrike" cap="none" dirty="0">
+              <a:solidFill>
+                <a:schemeClr val="dk1"/>
+              </a:solidFill>
+              <a:latin typeface="Arial"/>
+              <a:ea typeface="Arial"/>
+              <a:cs typeface="Arial"/>
+              <a:sym typeface="Arial"/>
+            </a:endParaRPr>
+          </a:p>
+        </p:txBody>
+      </p:sp>
+      <p:sp>
+        <p:nvSpPr>
+          <p:cNvPr id="13" name="TextBox 12"/>
+          <p:cNvSpPr txBox="1"/>
+          <p:nvPr/>
+        </p:nvSpPr>
+        <p:spPr>
+          <a:xfrm>
+            <a:off x="3579951" y="675635"/>
+            <a:ext cx="3280385" cy="246221"/>
+          </a:xfrm>
+          <a:prstGeom prst="rect">
+            <a:avLst/>
+          </a:prstGeom>
+          <a:noFill/>
+        </p:spPr>
+        <p:txBody>
+          <a:bodyPr wrap="square" rtlCol="0">
+            <a:spAutoFit/>
+          </a:bodyPr>
+          <a:lstStyle/>
+          <a:p>
+            <a:r>
+              <a:rPr lang="en-US" sz="1000" b="1" smtClean="0"/>
+              <a:t>Moving Up from </a:t>
+            </a:r>
+            <a:r>
+              <a:rPr lang="en-US" sz="1000" b="1" smtClean="0"/>
+              <a:t>3rd to 1st </a:t>
+            </a:r>
+            <a:r>
+              <a:rPr lang="en-US" sz="1000" b="1"/>
+              <a:t>to with stop on 2nd</a:t>
+            </a:r>
+            <a:endParaRPr lang="uk-UA" sz="1000" b="1"/>
+          </a:p>
+        </p:txBody>
+      </p:sp>
+      <p:sp>
+        <p:nvSpPr>
+          <p:cNvPr id="16" name="TextBox 15"/>
+          <p:cNvSpPr txBox="1"/>
+          <p:nvPr/>
+        </p:nvSpPr>
+        <p:spPr>
+          <a:xfrm>
+            <a:off x="54609" y="814134"/>
+            <a:ext cx="3141233" cy="707886"/>
+          </a:xfrm>
+          <a:prstGeom prst="rect">
+            <a:avLst/>
+          </a:prstGeom>
+          <a:noFill/>
+        </p:spPr>
+        <p:txBody>
+          <a:bodyPr wrap="square" rtlCol="0">
+            <a:spAutoFit/>
+          </a:bodyPr>
+          <a:lstStyle/>
+          <a:p>
+            <a:r>
+              <a:rPr lang="en-US" sz="1000" b="1" smtClean="0"/>
+              <a:t>Door switches:</a:t>
+            </a:r>
+          </a:p>
+          <a:p>
+            <a:pPr marL="171450" indent="-171450">
+              <a:buFont typeface="Arial" panose="020B0604020202020204" pitchFamily="34" charset="0"/>
+              <a:buChar char="•"/>
+            </a:pPr>
+            <a:r>
+              <a:rPr lang="en-US" sz="1000" smtClean="0"/>
+              <a:t>Closed = 1  </a:t>
+            </a:r>
+          </a:p>
+          <a:p>
+            <a:pPr marL="171450" indent="-171450">
+              <a:buFont typeface="Arial" panose="020B0604020202020204" pitchFamily="34" charset="0"/>
+              <a:buChar char="•"/>
+            </a:pPr>
+            <a:r>
+              <a:rPr lang="en-US" sz="1000"/>
+              <a:t>O</a:t>
+            </a:r>
+            <a:r>
+              <a:rPr lang="en-US" sz="1000" smtClean="0"/>
+              <a:t>pened = 2</a:t>
+            </a:r>
+          </a:p>
+          <a:p>
+            <a:pPr marL="171450" indent="-171450">
+              <a:buFont typeface="Arial" panose="020B0604020202020204" pitchFamily="34" charset="0"/>
+              <a:buChar char="•"/>
+            </a:pPr>
+            <a:endParaRPr lang="uk-UA" sz="1000" b="1"/>
+          </a:p>
+        </p:txBody>
+      </p:sp>
+      <p:sp>
+        <p:nvSpPr>
+          <p:cNvPr id="17" name="TextBox 16"/>
+          <p:cNvSpPr txBox="1"/>
+          <p:nvPr/>
+        </p:nvSpPr>
+        <p:spPr>
+          <a:xfrm>
+            <a:off x="54610" y="1542824"/>
+            <a:ext cx="3141233" cy="1323439"/>
+          </a:xfrm>
+          <a:prstGeom prst="rect">
+            <a:avLst/>
+          </a:prstGeom>
+          <a:noFill/>
+        </p:spPr>
+        <p:txBody>
+          <a:bodyPr wrap="square" rtlCol="0">
+            <a:spAutoFit/>
+          </a:bodyPr>
+          <a:lstStyle/>
+          <a:p>
+            <a:r>
+              <a:rPr lang="en-US" sz="1000" b="1" smtClean="0"/>
+              <a:t>Cabin switches:</a:t>
+            </a:r>
+          </a:p>
+          <a:p>
+            <a:pPr marL="171450" indent="-171450">
+              <a:buFont typeface="Arial" panose="020B0604020202020204" pitchFamily="34" charset="0"/>
+              <a:buChar char="•"/>
+            </a:pPr>
+            <a:r>
+              <a:rPr lang="en-US" sz="1000" smtClean="0"/>
+              <a:t>Max </a:t>
+            </a:r>
+            <a:r>
+              <a:rPr lang="en-US" sz="1000" smtClean="0"/>
+              <a:t>   =  </a:t>
+            </a:r>
+            <a:r>
+              <a:rPr lang="en-US" sz="1000" smtClean="0"/>
+              <a:t>5</a:t>
+            </a:r>
+          </a:p>
+          <a:p>
+            <a:pPr marL="171450" indent="-171450">
+              <a:buFont typeface="Arial" panose="020B0604020202020204" pitchFamily="34" charset="0"/>
+              <a:buChar char="•"/>
+            </a:pPr>
+            <a:r>
+              <a:rPr lang="en-US" sz="1000" smtClean="0"/>
+              <a:t>Low </a:t>
+            </a:r>
+            <a:r>
+              <a:rPr lang="en-US" sz="1000" smtClean="0"/>
+              <a:t>   = </a:t>
+            </a:r>
+            <a:r>
+              <a:rPr lang="en-US" sz="1000" smtClean="0"/>
+              <a:t>4</a:t>
+            </a:r>
+          </a:p>
+          <a:p>
+            <a:pPr marL="171450" indent="-171450">
+              <a:buFont typeface="Arial" panose="020B0604020202020204" pitchFamily="34" charset="0"/>
+              <a:buChar char="•"/>
+            </a:pPr>
+            <a:r>
+              <a:rPr lang="en-US" sz="1000" smtClean="0"/>
+              <a:t>Floor  = </a:t>
+            </a:r>
+            <a:r>
+              <a:rPr lang="en-US" sz="1000" smtClean="0"/>
+              <a:t>3</a:t>
+            </a:r>
+          </a:p>
+          <a:p>
+            <a:pPr marL="171450" indent="-171450">
+              <a:buFont typeface="Arial" panose="020B0604020202020204" pitchFamily="34" charset="0"/>
+              <a:buChar char="•"/>
+            </a:pPr>
+            <a:r>
+              <a:rPr lang="en-US" sz="1000"/>
+              <a:t>High </a:t>
+            </a:r>
+            <a:r>
+              <a:rPr lang="en-US" sz="1000" smtClean="0"/>
+              <a:t>  = </a:t>
+            </a:r>
+            <a:r>
+              <a:rPr lang="en-US" sz="1000" smtClean="0"/>
+              <a:t>2</a:t>
+            </a:r>
+          </a:p>
+          <a:p>
+            <a:pPr marL="171450" indent="-171450">
+              <a:buFont typeface="Arial" panose="020B0604020202020204" pitchFamily="34" charset="0"/>
+              <a:buChar char="•"/>
+            </a:pPr>
+            <a:r>
+              <a:rPr lang="en-US" sz="1000" smtClean="0"/>
+              <a:t>Min     </a:t>
+            </a:r>
+            <a:r>
+              <a:rPr lang="en-US" sz="1000" smtClean="0"/>
+              <a:t>= </a:t>
+            </a:r>
+            <a:r>
+              <a:rPr lang="en-US" sz="1000" smtClean="0"/>
+              <a:t>1</a:t>
+            </a:r>
+          </a:p>
+          <a:p>
+            <a:pPr marL="171450" indent="-171450">
+              <a:buFont typeface="Arial" panose="020B0604020202020204" pitchFamily="34" charset="0"/>
+              <a:buChar char="•"/>
+            </a:pPr>
+            <a:r>
+              <a:rPr lang="en-US" sz="1000" smtClean="0"/>
+              <a:t>No     = 0</a:t>
+            </a:r>
+            <a:endParaRPr lang="en-US" sz="1000" smtClean="0"/>
+          </a:p>
+          <a:p>
+            <a:pPr marL="171450" indent="-171450">
+              <a:buFont typeface="Arial" panose="020B0604020202020204" pitchFamily="34" charset="0"/>
+              <a:buChar char="•"/>
+            </a:pPr>
+            <a:endParaRPr lang="uk-UA" sz="1000" b="1"/>
+          </a:p>
+        </p:txBody>
+      </p:sp>
+      <p:sp>
+        <p:nvSpPr>
+          <p:cNvPr id="18" name="TextBox 17"/>
+          <p:cNvSpPr txBox="1"/>
+          <p:nvPr/>
+        </p:nvSpPr>
+        <p:spPr>
+          <a:xfrm>
+            <a:off x="54610" y="2780003"/>
+            <a:ext cx="3141233" cy="1631216"/>
+          </a:xfrm>
+          <a:prstGeom prst="rect">
+            <a:avLst/>
+          </a:prstGeom>
+          <a:noFill/>
+        </p:spPr>
+        <p:txBody>
+          <a:bodyPr wrap="square" rtlCol="0">
+            <a:spAutoFit/>
+          </a:bodyPr>
+          <a:lstStyle/>
+          <a:p>
+            <a:r>
+              <a:rPr lang="en-US" sz="1000" b="1" smtClean="0"/>
+              <a:t>Keys:</a:t>
+            </a:r>
+          </a:p>
+          <a:p>
+            <a:pPr marL="171450" indent="-171450">
+              <a:buFont typeface="Arial" panose="020B0604020202020204" pitchFamily="34" charset="0"/>
+              <a:buChar char="•"/>
+            </a:pPr>
+            <a:r>
+              <a:rPr lang="en-US" sz="1000" smtClean="0"/>
+              <a:t>Outcabin floor 3 =  -3</a:t>
+            </a:r>
+          </a:p>
+          <a:p>
+            <a:pPr marL="171450" indent="-171450">
+              <a:buFont typeface="Arial" panose="020B0604020202020204" pitchFamily="34" charset="0"/>
+              <a:buChar char="•"/>
+            </a:pPr>
+            <a:r>
+              <a:rPr lang="en-US" sz="1000"/>
+              <a:t>Outcabin floor </a:t>
+            </a:r>
+            <a:r>
+              <a:rPr lang="en-US" sz="1000" smtClean="0"/>
+              <a:t>2 </a:t>
+            </a:r>
+            <a:r>
+              <a:rPr lang="en-US" sz="1000"/>
+              <a:t>= </a:t>
+            </a:r>
+            <a:r>
+              <a:rPr lang="en-US" sz="1000" smtClean="0"/>
+              <a:t> -2</a:t>
+            </a:r>
+            <a:endParaRPr lang="en-US" sz="1000"/>
+          </a:p>
+          <a:p>
+            <a:pPr marL="171450" indent="-171450">
+              <a:buFont typeface="Arial" panose="020B0604020202020204" pitchFamily="34" charset="0"/>
+              <a:buChar char="•"/>
+            </a:pPr>
+            <a:r>
+              <a:rPr lang="en-US" sz="1000"/>
+              <a:t>Outcabin floor </a:t>
+            </a:r>
+            <a:r>
+              <a:rPr lang="en-US" sz="1000" smtClean="0"/>
+              <a:t>1 </a:t>
+            </a:r>
+            <a:r>
+              <a:rPr lang="en-US" sz="1000"/>
+              <a:t>= </a:t>
+            </a:r>
+            <a:r>
+              <a:rPr lang="en-US" sz="1000" smtClean="0"/>
+              <a:t> -</a:t>
+            </a:r>
+            <a:r>
+              <a:rPr lang="en-US" sz="1000" smtClean="0"/>
+              <a:t>1</a:t>
+            </a:r>
+          </a:p>
+          <a:p>
+            <a:pPr marL="171450" indent="-171450">
+              <a:buFont typeface="Arial" panose="020B0604020202020204" pitchFamily="34" charset="0"/>
+              <a:buChar char="•"/>
+            </a:pPr>
+            <a:r>
+              <a:rPr lang="en-US" sz="1000" smtClean="0"/>
+              <a:t>Not pressed       =  0</a:t>
+            </a:r>
+            <a:endParaRPr lang="en-US" sz="1000"/>
+          </a:p>
+          <a:p>
+            <a:pPr marL="171450" indent="-171450">
+              <a:buFont typeface="Arial" panose="020B0604020202020204" pitchFamily="34" charset="0"/>
+              <a:buChar char="•"/>
+            </a:pPr>
+            <a:r>
+              <a:rPr lang="en-US" sz="1000"/>
+              <a:t>Outcabin floor </a:t>
+            </a:r>
+            <a:r>
+              <a:rPr lang="en-US" sz="1000" smtClean="0"/>
+              <a:t>1 </a:t>
+            </a:r>
+            <a:r>
+              <a:rPr lang="en-US" sz="1000"/>
+              <a:t>=  1</a:t>
+            </a:r>
+          </a:p>
+          <a:p>
+            <a:pPr marL="171450" indent="-171450">
+              <a:buFont typeface="Arial" panose="020B0604020202020204" pitchFamily="34" charset="0"/>
+              <a:buChar char="•"/>
+            </a:pPr>
+            <a:r>
+              <a:rPr lang="en-US" sz="1000"/>
+              <a:t>Outcabin floor 2 =  </a:t>
+            </a:r>
+            <a:r>
+              <a:rPr lang="en-US" sz="1000" smtClean="0"/>
+              <a:t>2</a:t>
+            </a:r>
+            <a:endParaRPr lang="en-US" sz="1000"/>
+          </a:p>
+          <a:p>
+            <a:pPr marL="171450" indent="-171450">
+              <a:buFont typeface="Arial" panose="020B0604020202020204" pitchFamily="34" charset="0"/>
+              <a:buChar char="•"/>
+            </a:pPr>
+            <a:r>
+              <a:rPr lang="en-US" sz="1000"/>
+              <a:t>Outcabin floor </a:t>
+            </a:r>
+            <a:r>
+              <a:rPr lang="en-US" sz="1000" smtClean="0"/>
+              <a:t>3 </a:t>
+            </a:r>
+            <a:r>
+              <a:rPr lang="en-US" sz="1000"/>
+              <a:t>=  </a:t>
+            </a:r>
+            <a:r>
+              <a:rPr lang="en-US" sz="1000" smtClean="0"/>
+              <a:t>3</a:t>
+            </a:r>
+          </a:p>
+          <a:p>
+            <a:pPr marL="171450" indent="-171450">
+              <a:buFont typeface="Arial" panose="020B0604020202020204" pitchFamily="34" charset="0"/>
+              <a:buChar char="•"/>
+            </a:pPr>
+            <a:r>
+              <a:rPr lang="en-US" sz="1000" smtClean="0"/>
+              <a:t>Stop  = 4</a:t>
+            </a:r>
+            <a:endParaRPr lang="en-US" sz="1000"/>
+          </a:p>
+          <a:p>
+            <a:pPr marL="171450" indent="-171450">
+              <a:buFont typeface="Arial" panose="020B0604020202020204" pitchFamily="34" charset="0"/>
+              <a:buChar char="•"/>
+            </a:pPr>
+            <a:endParaRPr lang="uk-UA" sz="1000" b="1"/>
+          </a:p>
+        </p:txBody>
+      </p:sp>
+      <p:pic>
+        <p:nvPicPr>
+          <p:cNvPr id="2" name="Рисунок 1"/>
+          <p:cNvPicPr>
+            <a:picLocks noChangeAspect="1"/>
+          </p:cNvPicPr>
+          <p:nvPr/>
+        </p:nvPicPr>
+        <p:blipFill>
+          <a:blip r:embed="rId3"/>
+          <a:stretch>
+            <a:fillRect/>
+          </a:stretch>
+        </p:blipFill>
+        <p:spPr>
+          <a:xfrm>
+            <a:off x="1769196" y="921856"/>
+            <a:ext cx="2060769" cy="3863940"/>
+          </a:xfrm>
+          <a:prstGeom prst="rect">
+            <a:avLst/>
+          </a:prstGeom>
+        </p:spPr>
+      </p:pic>
+      <p:sp>
+        <p:nvSpPr>
+          <p:cNvPr id="3" name="Прямоугольник 2"/>
+          <p:cNvSpPr/>
+          <p:nvPr/>
+        </p:nvSpPr>
+        <p:spPr>
+          <a:xfrm>
+            <a:off x="1625227" y="2434835"/>
+            <a:ext cx="1419187" cy="233061"/>
+          </a:xfrm>
+          <a:prstGeom prst="rect">
+            <a:avLst/>
+          </a:prstGeom>
+          <a:noFill/>
+          <a:ln w="19050">
+            <a:solidFill>
+              <a:srgbClr val="FF0000"/>
+            </a:solidFill>
+          </a:ln>
+        </p:spPr>
+        <p:style>
+          <a:lnRef idx="2">
+            <a:schemeClr val="accent1">
+              <a:shade val="50000"/>
+            </a:schemeClr>
+          </a:lnRef>
+          <a:fillRef idx="1">
+            <a:schemeClr val="accent1"/>
+          </a:fillRef>
+          <a:effectRef idx="0">
+            <a:schemeClr val="accent1"/>
+          </a:effectRef>
+          <a:fontRef idx="minor">
+            <a:schemeClr val="lt1"/>
+          </a:fontRef>
+        </p:style>
+        <p:txBody>
+          <a:bodyPr lIns="108000" tIns="108000" rIns="108000" bIns="108000" rtlCol="0" anchor="t" anchorCtr="0"/>
+          <a:lstStyle/>
+          <a:p>
+            <a:pPr algn="l"/>
+            <a:endParaRPr lang="ru-RU" dirty="0">
+              <a:solidFill>
+                <a:schemeClr val="tx1"/>
+              </a:solidFill>
+            </a:endParaRPr>
           </a:p>
         </p:txBody>
       </p:sp>
@@ -5488,14 +6904,64 @@
         </p:blipFill>
         <p:spPr>
           <a:xfrm>
-            <a:off x="1799353" y="886275"/>
-            <a:ext cx="1696187" cy="3042073"/>
+            <a:off x="4013625" y="946731"/>
+            <a:ext cx="1974726" cy="3863940"/>
           </a:xfrm>
           <a:prstGeom prst="rect">
             <a:avLst/>
           </a:prstGeom>
         </p:spPr>
       </p:pic>
+      <p:sp>
+        <p:nvSpPr>
+          <p:cNvPr id="20" name="Прямоугольник 19"/>
+          <p:cNvSpPr/>
+          <p:nvPr/>
+        </p:nvSpPr>
+        <p:spPr>
+          <a:xfrm>
+            <a:off x="3923990" y="3000802"/>
+            <a:ext cx="1848168" cy="193637"/>
+          </a:xfrm>
+          <a:prstGeom prst="rect">
+            <a:avLst/>
+          </a:prstGeom>
+          <a:noFill/>
+          <a:ln w="19050">
+            <a:solidFill>
+              <a:srgbClr val="FF0000"/>
+            </a:solidFill>
+          </a:ln>
+        </p:spPr>
+        <p:style>
+          <a:lnRef idx="2">
+            <a:schemeClr val="accent1">
+              <a:shade val="50000"/>
+            </a:schemeClr>
+          </a:lnRef>
+          <a:fillRef idx="1">
+            <a:schemeClr val="accent1"/>
+          </a:fillRef>
+          <a:effectRef idx="0">
+            <a:schemeClr val="accent1"/>
+          </a:effectRef>
+          <a:fontRef idx="minor">
+            <a:schemeClr val="lt1"/>
+          </a:fontRef>
+        </p:style>
+        <p:txBody>
+          <a:bodyPr lIns="108000" tIns="108000" rIns="108000" bIns="108000" rtlCol="0" anchor="t" anchorCtr="0"/>
+          <a:lstStyle/>
+          <a:p>
+            <a:pPr algn="l"/>
+            <a:endParaRPr lang="ru-RU" dirty="0">
+              <a:solidFill>
+                <a:schemeClr val="tx1"/>
+              </a:solidFill>
+            </a:endParaRPr>
+          </a:p>
+        </p:txBody>
+      </p:sp>
       <p:pic>
         <p:nvPicPr>
           <p:cNvPr id="9" name="Рисунок 8"/>
@@ -5512,530 +6978,68 @@
         </p:blipFill>
         <p:spPr>
           <a:xfrm>
-            <a:off x="3604783" y="886275"/>
-            <a:ext cx="1635432" cy="3042073"/>
+            <a:off x="6269290" y="946731"/>
+            <a:ext cx="2196978" cy="3889387"/>
           </a:xfrm>
           <a:prstGeom prst="rect">
             <a:avLst/>
           </a:prstGeom>
         </p:spPr>
       </p:pic>
-      <p:pic>
-        <p:nvPicPr>
-          <p:cNvPr id="10" name="Рисунок 9"/>
-          <p:cNvPicPr>
-            <a:picLocks noChangeAspect="1"/>
-          </p:cNvPicPr>
-          <p:nvPr/>
-        </p:nvPicPr>
-        <p:blipFill>
-          <a:blip r:embed="rId6"/>
-          <a:stretch>
-            <a:fillRect/>
-          </a:stretch>
-        </p:blipFill>
-        <p:spPr>
-          <a:xfrm>
-            <a:off x="5349458" y="886275"/>
-            <a:ext cx="1779513" cy="3042073"/>
-          </a:xfrm>
-          <a:prstGeom prst="rect">
-            <a:avLst/>
-          </a:prstGeom>
-        </p:spPr>
-      </p:pic>
       <p:sp>
         <p:nvSpPr>
-          <p:cNvPr id="12" name="TextBox 11"/>
-          <p:cNvSpPr txBox="1"/>
+          <p:cNvPr id="22" name="Прямоугольник 21"/>
+          <p:cNvSpPr/>
           <p:nvPr/>
         </p:nvSpPr>
         <p:spPr>
           <a:xfrm>
-            <a:off x="1758004" y="640053"/>
-            <a:ext cx="2197385" cy="246221"/>
+            <a:off x="6172011" y="2891424"/>
+            <a:ext cx="1848168" cy="193637"/>
           </a:xfrm>
           <a:prstGeom prst="rect">
             <a:avLst/>
           </a:prstGeom>
           <a:noFill/>
-        </p:spPr>
+          <a:ln w="19050">
+            <a:solidFill>
+              <a:srgbClr val="FF0000"/>
+            </a:solidFill>
+          </a:ln>
+        </p:spPr>
+        <p:style>
+          <a:lnRef idx="2">
+            <a:schemeClr val="accent1">
+              <a:shade val="50000"/>
+            </a:schemeClr>
+          </a:lnRef>
+          <a:fillRef idx="1">
+            <a:schemeClr val="accent1"/>
+          </a:fillRef>
+          <a:effectRef idx="0">
+            <a:schemeClr val="accent1"/>
+          </a:effectRef>
+          <a:fontRef idx="minor">
+            <a:schemeClr val="lt1"/>
+          </a:fontRef>
+        </p:style>
         <p:txBody>
-          <a:bodyPr wrap="square" rtlCol="0">
-            <a:spAutoFit/>
-          </a:bodyPr>
+          <a:bodyPr lIns="108000" tIns="108000" rIns="108000" bIns="108000" rtlCol="0" anchor="t" anchorCtr="0"/>
           <a:lstStyle/>
           <a:p>
-            <a:r>
-              <a:rPr lang="en-US" sz="1000" b="1" smtClean="0"/>
-              <a:t>Moving Up from 1st to 2nd</a:t>
-            </a:r>
-            <a:endParaRPr lang="uk-UA" sz="1000" b="1"/>
+            <a:pPr algn="l"/>
+            <a:endParaRPr lang="ru-RU" dirty="0">
+              <a:solidFill>
+                <a:schemeClr val="tx1"/>
+              </a:solidFill>
+            </a:endParaRPr>
           </a:p>
         </p:txBody>
       </p:sp>
-      <p:sp>
-        <p:nvSpPr>
-          <p:cNvPr id="13" name="TextBox 12"/>
-          <p:cNvSpPr txBox="1"/>
-          <p:nvPr/>
-        </p:nvSpPr>
-        <p:spPr>
-          <a:xfrm>
-            <a:off x="3536889" y="640053"/>
-            <a:ext cx="2197385" cy="246221"/>
-          </a:xfrm>
-          <a:prstGeom prst="rect">
-            <a:avLst/>
-          </a:prstGeom>
-          <a:noFill/>
-        </p:spPr>
-        <p:txBody>
-          <a:bodyPr wrap="square" rtlCol="0">
-            <a:spAutoFit/>
-          </a:bodyPr>
-          <a:lstStyle/>
-          <a:p>
-            <a:r>
-              <a:rPr lang="en-US" sz="1000" b="1" smtClean="0"/>
-              <a:t>Moving Up from 1st to 3rd</a:t>
-            </a:r>
-            <a:endParaRPr lang="uk-UA" sz="1000" b="1"/>
-          </a:p>
-        </p:txBody>
-      </p:sp>
-      <p:sp>
-        <p:nvSpPr>
-          <p:cNvPr id="14" name="TextBox 13"/>
-          <p:cNvSpPr txBox="1"/>
-          <p:nvPr/>
-        </p:nvSpPr>
-        <p:spPr>
-          <a:xfrm>
-            <a:off x="5270680" y="628358"/>
-            <a:ext cx="2197385" cy="246221"/>
-          </a:xfrm>
-          <a:prstGeom prst="rect">
-            <a:avLst/>
-          </a:prstGeom>
-          <a:noFill/>
-        </p:spPr>
-        <p:txBody>
-          <a:bodyPr wrap="square" rtlCol="0">
-            <a:spAutoFit/>
-          </a:bodyPr>
-          <a:lstStyle/>
-          <a:p>
-            <a:r>
-              <a:rPr lang="en-US" sz="1000" b="1" smtClean="0"/>
-              <a:t>Moving Down from 3rd to 2nd</a:t>
-            </a:r>
-            <a:endParaRPr lang="uk-UA" sz="1000" b="1"/>
-          </a:p>
-        </p:txBody>
-      </p:sp>
-      <p:sp>
-        <p:nvSpPr>
-          <p:cNvPr id="15" name="TextBox 14"/>
-          <p:cNvSpPr txBox="1"/>
-          <p:nvPr/>
-        </p:nvSpPr>
-        <p:spPr>
-          <a:xfrm>
-            <a:off x="7190604" y="640053"/>
-            <a:ext cx="2197385" cy="246221"/>
-          </a:xfrm>
-          <a:prstGeom prst="rect">
-            <a:avLst/>
-          </a:prstGeom>
-          <a:noFill/>
-        </p:spPr>
-        <p:txBody>
-          <a:bodyPr wrap="square" rtlCol="0">
-            <a:spAutoFit/>
-          </a:bodyPr>
-          <a:lstStyle/>
-          <a:p>
-            <a:r>
-              <a:rPr lang="en-US" sz="1000" b="1" smtClean="0"/>
-              <a:t>Moving Down from 3rd to 2nd</a:t>
-            </a:r>
-            <a:endParaRPr lang="uk-UA" sz="1000" b="1"/>
-          </a:p>
-        </p:txBody>
-      </p:sp>
-      <p:sp>
-        <p:nvSpPr>
-          <p:cNvPr id="16" name="TextBox 15"/>
-          <p:cNvSpPr txBox="1"/>
-          <p:nvPr/>
-        </p:nvSpPr>
-        <p:spPr>
-          <a:xfrm>
-            <a:off x="119493" y="3887720"/>
-            <a:ext cx="3141233" cy="707886"/>
-          </a:xfrm>
-          <a:prstGeom prst="rect">
-            <a:avLst/>
-          </a:prstGeom>
-          <a:noFill/>
-        </p:spPr>
-        <p:txBody>
-          <a:bodyPr wrap="square" rtlCol="0">
-            <a:spAutoFit/>
-          </a:bodyPr>
-          <a:lstStyle/>
-          <a:p>
-            <a:r>
-              <a:rPr lang="en-US" sz="1000" b="1" smtClean="0"/>
-              <a:t>Door switches:</a:t>
-            </a:r>
-          </a:p>
-          <a:p>
-            <a:pPr marL="171450" indent="-171450">
-              <a:buFont typeface="Arial" panose="020B0604020202020204" pitchFamily="34" charset="0"/>
-              <a:buChar char="•"/>
-            </a:pPr>
-            <a:r>
-              <a:rPr lang="en-US" sz="1000" smtClean="0"/>
-              <a:t>Closed = 1  </a:t>
-            </a:r>
-          </a:p>
-          <a:p>
-            <a:pPr marL="171450" indent="-171450">
-              <a:buFont typeface="Arial" panose="020B0604020202020204" pitchFamily="34" charset="0"/>
-              <a:buChar char="•"/>
-            </a:pPr>
-            <a:r>
-              <a:rPr lang="en-US" sz="1000"/>
-              <a:t>O</a:t>
-            </a:r>
-            <a:r>
-              <a:rPr lang="en-US" sz="1000" smtClean="0"/>
-              <a:t>pened = 2</a:t>
-            </a:r>
-          </a:p>
-          <a:p>
-            <a:pPr marL="171450" indent="-171450">
-              <a:buFont typeface="Arial" panose="020B0604020202020204" pitchFamily="34" charset="0"/>
-              <a:buChar char="•"/>
-            </a:pPr>
-            <a:endParaRPr lang="uk-UA" sz="1000" b="1"/>
-          </a:p>
-        </p:txBody>
-      </p:sp>
-      <p:sp>
-        <p:nvSpPr>
-          <p:cNvPr id="17" name="TextBox 16"/>
-          <p:cNvSpPr txBox="1"/>
-          <p:nvPr/>
-        </p:nvSpPr>
-        <p:spPr>
-          <a:xfrm>
-            <a:off x="1281266" y="3898479"/>
-            <a:ext cx="3141233" cy="1169551"/>
-          </a:xfrm>
-          <a:prstGeom prst="rect">
-            <a:avLst/>
-          </a:prstGeom>
-          <a:noFill/>
-        </p:spPr>
-        <p:txBody>
-          <a:bodyPr wrap="square" rtlCol="0">
-            <a:spAutoFit/>
-          </a:bodyPr>
-          <a:lstStyle/>
-          <a:p>
-            <a:r>
-              <a:rPr lang="en-US" sz="1000" b="1" smtClean="0"/>
-              <a:t>Cabin switches:</a:t>
-            </a:r>
-          </a:p>
-          <a:p>
-            <a:pPr marL="171450" indent="-171450">
-              <a:buFont typeface="Arial" panose="020B0604020202020204" pitchFamily="34" charset="0"/>
-              <a:buChar char="•"/>
-            </a:pPr>
-            <a:r>
-              <a:rPr lang="en-US" sz="1000" smtClean="0"/>
-              <a:t>Max =  5</a:t>
-            </a:r>
-          </a:p>
-          <a:p>
-            <a:pPr marL="171450" indent="-171450">
-              <a:buFont typeface="Arial" panose="020B0604020202020204" pitchFamily="34" charset="0"/>
-              <a:buChar char="•"/>
-            </a:pPr>
-            <a:r>
-              <a:rPr lang="en-US" sz="1000" smtClean="0"/>
-              <a:t>Low = 4</a:t>
-            </a:r>
-          </a:p>
-          <a:p>
-            <a:pPr marL="171450" indent="-171450">
-              <a:buFont typeface="Arial" panose="020B0604020202020204" pitchFamily="34" charset="0"/>
-              <a:buChar char="•"/>
-            </a:pPr>
-            <a:r>
-              <a:rPr lang="en-US" sz="1000"/>
-              <a:t>Floor </a:t>
-            </a:r>
-            <a:r>
-              <a:rPr lang="en-US" sz="1000"/>
-              <a:t>= </a:t>
-            </a:r>
-            <a:r>
-              <a:rPr lang="en-US" sz="1000" smtClean="0"/>
-              <a:t>3</a:t>
-            </a:r>
-          </a:p>
-          <a:p>
-            <a:pPr marL="171450" indent="-171450">
-              <a:buFont typeface="Arial" panose="020B0604020202020204" pitchFamily="34" charset="0"/>
-              <a:buChar char="•"/>
-            </a:pPr>
-            <a:r>
-              <a:rPr lang="en-US" sz="1000"/>
-              <a:t>High </a:t>
-            </a:r>
-            <a:r>
-              <a:rPr lang="en-US" sz="1000"/>
-              <a:t>= </a:t>
-            </a:r>
-            <a:r>
-              <a:rPr lang="en-US" sz="1000" smtClean="0"/>
-              <a:t>2</a:t>
-            </a:r>
-          </a:p>
-          <a:p>
-            <a:pPr marL="171450" indent="-171450">
-              <a:buFont typeface="Arial" panose="020B0604020202020204" pitchFamily="34" charset="0"/>
-              <a:buChar char="•"/>
-            </a:pPr>
-            <a:r>
-              <a:rPr lang="en-US" sz="1000" smtClean="0"/>
-              <a:t>Min = 1</a:t>
-            </a:r>
-          </a:p>
-          <a:p>
-            <a:pPr marL="171450" indent="-171450">
-              <a:buFont typeface="Arial" panose="020B0604020202020204" pitchFamily="34" charset="0"/>
-              <a:buChar char="•"/>
-            </a:pPr>
-            <a:endParaRPr lang="uk-UA" sz="1000" b="1"/>
-          </a:p>
-        </p:txBody>
-      </p:sp>
-      <p:sp>
-        <p:nvSpPr>
-          <p:cNvPr id="18" name="TextBox 17"/>
-          <p:cNvSpPr txBox="1"/>
-          <p:nvPr/>
-        </p:nvSpPr>
-        <p:spPr>
-          <a:xfrm>
-            <a:off x="2443039" y="3887721"/>
-            <a:ext cx="3141233" cy="1477328"/>
-          </a:xfrm>
-          <a:prstGeom prst="rect">
-            <a:avLst/>
-          </a:prstGeom>
-          <a:noFill/>
-        </p:spPr>
-        <p:txBody>
-          <a:bodyPr wrap="square" rtlCol="0">
-            <a:spAutoFit/>
-          </a:bodyPr>
-          <a:lstStyle/>
-          <a:p>
-            <a:r>
-              <a:rPr lang="en-US" sz="1000" b="1" smtClean="0"/>
-              <a:t>Keys:</a:t>
-            </a:r>
-          </a:p>
-          <a:p>
-            <a:pPr marL="171450" indent="-171450">
-              <a:buFont typeface="Arial" panose="020B0604020202020204" pitchFamily="34" charset="0"/>
-              <a:buChar char="•"/>
-            </a:pPr>
-            <a:r>
-              <a:rPr lang="en-US" sz="1000" smtClean="0"/>
-              <a:t>Outcabin floor 3 =  -3</a:t>
-            </a:r>
-          </a:p>
-          <a:p>
-            <a:pPr marL="171450" indent="-171450">
-              <a:buFont typeface="Arial" panose="020B0604020202020204" pitchFamily="34" charset="0"/>
-              <a:buChar char="•"/>
-            </a:pPr>
-            <a:r>
-              <a:rPr lang="en-US" sz="1000"/>
-              <a:t>Outcabin </a:t>
-            </a:r>
-            <a:r>
-              <a:rPr lang="en-US" sz="1000"/>
-              <a:t>floor </a:t>
-            </a:r>
-            <a:r>
-              <a:rPr lang="en-US" sz="1000" smtClean="0"/>
-              <a:t>2 </a:t>
-            </a:r>
-            <a:r>
-              <a:rPr lang="en-US" sz="1000"/>
-              <a:t>= </a:t>
-            </a:r>
-            <a:r>
-              <a:rPr lang="en-US" sz="1000" smtClean="0"/>
-              <a:t> -2</a:t>
-            </a:r>
-            <a:endParaRPr lang="en-US" sz="1000"/>
-          </a:p>
-          <a:p>
-            <a:pPr marL="171450" indent="-171450">
-              <a:buFont typeface="Arial" panose="020B0604020202020204" pitchFamily="34" charset="0"/>
-              <a:buChar char="•"/>
-            </a:pPr>
-            <a:r>
-              <a:rPr lang="en-US" sz="1000"/>
-              <a:t>Outcabin </a:t>
-            </a:r>
-            <a:r>
-              <a:rPr lang="en-US" sz="1000"/>
-              <a:t>floor </a:t>
-            </a:r>
-            <a:r>
-              <a:rPr lang="en-US" sz="1000" smtClean="0"/>
-              <a:t>1 </a:t>
-            </a:r>
-            <a:r>
-              <a:rPr lang="en-US" sz="1000"/>
-              <a:t>= </a:t>
-            </a:r>
-            <a:r>
-              <a:rPr lang="en-US" sz="1000" smtClean="0"/>
-              <a:t> -1</a:t>
-            </a:r>
-            <a:endParaRPr lang="en-US" sz="1000"/>
-          </a:p>
-          <a:p>
-            <a:pPr marL="171450" indent="-171450">
-              <a:buFont typeface="Arial" panose="020B0604020202020204" pitchFamily="34" charset="0"/>
-              <a:buChar char="•"/>
-            </a:pPr>
-            <a:r>
-              <a:rPr lang="en-US" sz="1000"/>
-              <a:t>Outcabin </a:t>
-            </a:r>
-            <a:r>
-              <a:rPr lang="en-US" sz="1000"/>
-              <a:t>floor </a:t>
-            </a:r>
-            <a:r>
-              <a:rPr lang="en-US" sz="1000" smtClean="0"/>
-              <a:t>1 </a:t>
-            </a:r>
-            <a:r>
-              <a:rPr lang="en-US" sz="1000"/>
-              <a:t>=  </a:t>
-            </a:r>
-            <a:r>
-              <a:rPr lang="en-US" sz="1000"/>
-              <a:t>1</a:t>
-            </a:r>
-          </a:p>
-          <a:p>
-            <a:pPr marL="171450" indent="-171450">
-              <a:buFont typeface="Arial" panose="020B0604020202020204" pitchFamily="34" charset="0"/>
-              <a:buChar char="•"/>
-            </a:pPr>
-            <a:r>
-              <a:rPr lang="en-US" sz="1000"/>
-              <a:t>Outcabin floor 2 </a:t>
-            </a:r>
-            <a:r>
-              <a:rPr lang="en-US" sz="1000"/>
-              <a:t>=  </a:t>
-            </a:r>
-            <a:r>
-              <a:rPr lang="en-US" sz="1000" smtClean="0"/>
-              <a:t>2</a:t>
-            </a:r>
-            <a:endParaRPr lang="en-US" sz="1000"/>
-          </a:p>
-          <a:p>
-            <a:pPr marL="171450" indent="-171450">
-              <a:buFont typeface="Arial" panose="020B0604020202020204" pitchFamily="34" charset="0"/>
-              <a:buChar char="•"/>
-            </a:pPr>
-            <a:r>
-              <a:rPr lang="en-US" sz="1000"/>
-              <a:t>Outcabin </a:t>
-            </a:r>
-            <a:r>
-              <a:rPr lang="en-US" sz="1000"/>
-              <a:t>floor </a:t>
-            </a:r>
-            <a:r>
-              <a:rPr lang="en-US" sz="1000" smtClean="0"/>
-              <a:t>3 </a:t>
-            </a:r>
-            <a:r>
-              <a:rPr lang="en-US" sz="1000"/>
-              <a:t>=  </a:t>
-            </a:r>
-            <a:r>
-              <a:rPr lang="en-US" sz="1000" smtClean="0"/>
-              <a:t>3</a:t>
-            </a:r>
-          </a:p>
-          <a:p>
-            <a:pPr marL="171450" indent="-171450">
-              <a:buFont typeface="Arial" panose="020B0604020202020204" pitchFamily="34" charset="0"/>
-              <a:buChar char="•"/>
-            </a:pPr>
-            <a:r>
-              <a:rPr lang="en-US" sz="1000" smtClean="0"/>
-              <a:t>Stop  = 4</a:t>
-            </a:r>
-            <a:endParaRPr lang="en-US" sz="1000"/>
-          </a:p>
-          <a:p>
-            <a:pPr marL="171450" indent="-171450">
-              <a:buFont typeface="Arial" panose="020B0604020202020204" pitchFamily="34" charset="0"/>
-              <a:buChar char="•"/>
-            </a:pPr>
-            <a:endParaRPr lang="uk-UA" sz="1000" b="1"/>
-          </a:p>
-        </p:txBody>
-      </p:sp>
-      <p:pic>
-        <p:nvPicPr>
-          <p:cNvPr id="3" name="Рисунок 2"/>
-          <p:cNvPicPr>
-            <a:picLocks noChangeAspect="1"/>
-          </p:cNvPicPr>
-          <p:nvPr/>
-        </p:nvPicPr>
-        <p:blipFill>
-          <a:blip r:embed="rId7"/>
-          <a:stretch>
-            <a:fillRect/>
-          </a:stretch>
-        </p:blipFill>
-        <p:spPr>
-          <a:xfrm>
-            <a:off x="7343426" y="897969"/>
-            <a:ext cx="1576737" cy="3042074"/>
-          </a:xfrm>
-          <a:prstGeom prst="rect">
-            <a:avLst/>
-          </a:prstGeom>
-        </p:spPr>
-      </p:pic>
     </p:spTree>
     <p:extLst>
       <p:ext uri="{BB962C8B-B14F-4D97-AF65-F5344CB8AC3E}">
-        <p14:creationId xmlns:p14="http://schemas.microsoft.com/office/powerpoint/2010/main" val="2368913712"/>
+        <p14:creationId xmlns:p14="http://schemas.microsoft.com/office/powerpoint/2010/main" val="1155446011"/>
       </p:ext>
     </p:extLst>
   </p:cSld>
@@ -6824,12 +7828,158 @@
 </file>
 
 <file path=customXml/item1.xml><?xml version="1.0" encoding="utf-8"?>
-<?mso-contentType ?>
-<FormTemplates xmlns="http://schemas.microsoft.com/sharepoint/v3/contenttype/forms">
-  <Display>DocumentLibraryForm</Display>
-  <Edit>DocumentLibraryForm</Edit>
-  <New>DocumentLibraryForm</New>
-</FormTemplates>
+<p:properties xmlns:p="http://schemas.microsoft.com/office/2006/metadata/properties" xmlns:xsi="http://www.w3.org/2001/XMLSchema-instance" xmlns:pc="http://schemas.microsoft.com/office/infopath/2007/PartnerControls">
+  <documentManagement>
+    <PersistReviewDate xmlns="38310968-5489-4908-a7fd-28d77d77180b">true</PersistReviewDate>
+    <AccessLevels xmlns="38310968-5489-4908-a7fd-28d77d77180b" xsi:nil="true"/>
+    <fa2edfbc4bd54f5daa2bdbccf446cdae xmlns="38310968-5489-4908-a7fd-28d77d77180b">
+      <Terms xmlns="http://schemas.microsoft.com/office/infopath/2007/PartnerControls"/>
+    </fa2edfbc4bd54f5daa2bdbccf446cdae>
+    <DocumentAuthor xmlns="38310968-5489-4908-a7fd-28d77d77180b">
+      <UserInfo>
+        <DisplayName>Hancox, Sophie (S.C.)</DisplayName>
+        <AccountId>49379</AccountId>
+        <AccountType/>
+      </UserInfo>
+    </DocumentAuthor>
+    <DocumentContentOwner xmlns="38310968-5489-4908-a7fd-28d77d77180b">
+      <UserInfo>
+        <DisplayName>Harman, Michelle (M.J.)</DisplayName>
+        <AccountId>13864</AccountId>
+        <AccountType/>
+      </UserInfo>
+    </DocumentContentOwner>
+    <PublishedDocumentUrl xmlns="38310968-5489-4908-a7fd-28d77d77180b">&lt;a href="/sites/jlrway/wi/Documents/Template/JLR%20Template%2016-9.pptx"&gt;JLR Template 16-9.pptx&lt;/a&gt;</PublishedDocumentUrl>
+    <n8842fbf44284d17b0e5de552104aaf7 xmlns="38310968-5489-4908-a7fd-28d77d77180b">
+      <Terms xmlns="http://schemas.microsoft.com/office/infopath/2007/PartnerControls">
+        <TermInfo xmlns="http://schemas.microsoft.com/office/infopath/2007/PartnerControls">
+          <TermName xmlns="http://schemas.microsoft.com/office/infopath/2007/PartnerControls">All</TermName>
+          <TermId xmlns="http://schemas.microsoft.com/office/infopath/2007/PartnerControls">ff20392c-f58a-4878-bc07-3294c3236521</TermId>
+        </TermInfo>
+      </Terms>
+    </n8842fbf44284d17b0e5de552104aaf7>
+    <ReviewDate xmlns="38310968-5489-4908-a7fd-28d77d77180b">2017-06-19T23:00:00+00:00</ReviewDate>
+    <RetentionSuspended xmlns="38310968-5489-4908-a7fd-28d77d77180b">false</RetentionSuspended>
+    <DocumentApprovers xmlns="38310968-5489-4908-a7fd-28d77d77180b">
+      <UserInfo>
+        <DisplayName/>
+        <AccountId xsi:nil="true"/>
+        <AccountType/>
+      </UserInfo>
+    </DocumentApprovers>
+    <DatePublished xmlns="38310968-5489-4908-a7fd-28d77d77180b">2017-03-13T12:26:19+00:00</DatePublished>
+    <cf433fb806414c1d854ab57603b41329 xmlns="38310968-5489-4908-a7fd-28d77d77180b">
+      <Terms xmlns="http://schemas.microsoft.com/office/infopath/2007/PartnerControls">
+        <TermInfo xmlns="http://schemas.microsoft.com/office/infopath/2007/PartnerControls">
+          <TermName xmlns="http://schemas.microsoft.com/office/infopath/2007/PartnerControls">Marketing Sales and Service</TermName>
+          <TermId xmlns="http://schemas.microsoft.com/office/infopath/2007/PartnerControls">3617296b-c237-41b7-9e55-0214083b70db</TermId>
+        </TermInfo>
+      </Terms>
+    </cf433fb806414c1d854ab57603b41329>
+    <of61fea281d5434f8b92ac0a7fa77a43 xmlns="38310968-5489-4908-a7fd-28d77d77180b">
+      <Terms xmlns="http://schemas.microsoft.com/office/infopath/2007/PartnerControls">
+        <TermInfo xmlns="http://schemas.microsoft.com/office/infopath/2007/PartnerControls">
+          <TermName xmlns="http://schemas.microsoft.com/office/infopath/2007/PartnerControls">10. Brand Model Creation and Delivery System</TermName>
+          <TermId xmlns="http://schemas.microsoft.com/office/infopath/2007/PartnerControls">de5707f0-2d77-48b5-bec9-1ea2ad0deed3</TermId>
+        </TermInfo>
+        <TermInfo xmlns="http://schemas.microsoft.com/office/infopath/2007/PartnerControls">
+          <TermName xmlns="http://schemas.microsoft.com/office/infopath/2007/PartnerControls">#10.04 Define Brand Strategy</TermName>
+          <TermId xmlns="http://schemas.microsoft.com/office/infopath/2007/PartnerControls">d698321a-69e2-467e-9ad2-c081f697bce6</TermId>
+        </TermInfo>
+      </Terms>
+    </of61fea281d5434f8b92ac0a7fa77a43>
+    <PublishedVersion xmlns="38310968-5489-4908-a7fd-28d77d77180b">3</PublishedVersion>
+    <WorkingVersion xmlns="38310968-5489-4908-a7fd-28d77d77180b">3</WorkingVersion>
+    <DocumentSummary xmlns="38310968-5489-4908-a7fd-28d77d77180b">JLR Dual Brand PowerPoint Template </DocumentSummary>
+    <DocumentReference xmlns="38310968-5489-4908-a7fd-28d77d77180b">JLR-TMP-58523</DocumentReference>
+    <ApplicableSites xmlns="38310968-5489-4908-a7fd-28d77d77180b">
+      <Value>All UK Sites</Value>
+    </ApplicableSites>
+    <ParentDocumentReference xmlns="38310968-5489-4908-a7fd-28d77d77180b" xsi:nil="true"/>
+    <gb9cd096587b405d8fabe5771bc7e394 xmlns="38310968-5489-4908-a7fd-28d77d77180b">
+      <Terms xmlns="http://schemas.microsoft.com/office/infopath/2007/PartnerControls"/>
+    </gb9cd096587b405d8fabe5771bc7e394>
+    <f8f94e19fc5440d0b83a424959612cbe xmlns="38310968-5489-4908-a7fd-28d77d77180b">
+      <Terms xmlns="http://schemas.microsoft.com/office/infopath/2007/PartnerControls"/>
+    </f8f94e19fc5440d0b83a424959612cbe>
+    <ComplianceStatus xmlns="38310968-5489-4908-a7fd-28d77d77180b">JLR Way compliant</ComplianceStatus>
+    <DocumentStatus xmlns="38310968-5489-4908-a7fd-28d77d77180b">Draft</DocumentStatus>
+    <TaxCatchAll xmlns="38310968-5489-4908-a7fd-28d77d77180b">
+      <Value>648</Value>
+      <Value>647</Value>
+      <Value>438</Value>
+      <Value>1905</Value>
+      <Value>386</Value>
+      <Value>869</Value>
+    </TaxCatchAll>
+    <l5334508f5e044ed9486fe21a075889a xmlns="38310968-5489-4908-a7fd-28d77d77180b">
+      <Terms xmlns="http://schemas.microsoft.com/office/infopath/2007/PartnerControls"/>
+    </l5334508f5e044ed9486fe21a075889a>
+    <DocumentReady xmlns="38310968-5489-4908-a7fd-28d77d77180b">true</DocumentReady>
+    <aa45e664c19f4984ae512c95e2c99bac xmlns="38310968-5489-4908-a7fd-28d77d77180b">
+      <Terms xmlns="http://schemas.microsoft.com/office/infopath/2007/PartnerControls"/>
+    </aa45e664c19f4984ae512c95e2c99bac>
+    <DocumentType xmlns="38310968-5489-4908-a7fd-28d77d77180b" xsi:nil="true"/>
+    <ParentDocument xmlns="38310968-5489-4908-a7fd-28d77d77180b" xsi:nil="true"/>
+    <ContentAudience xmlns="38310968-5489-4908-a7fd-28d77d77180b">
+      <UserInfo>
+        <DisplayName/>
+        <AccountId xsi:nil="true"/>
+        <AccountType/>
+      </UserInfo>
+    </ContentAudience>
+    <DocumentReviewers xmlns="38310968-5489-4908-a7fd-28d77d77180b">
+      <UserInfo>
+        <DisplayName/>
+        <AccountId xsi:nil="true"/>
+        <AccountType/>
+      </UserInfo>
+    </DocumentReviewers>
+    <RetentionDate xmlns="38310968-5489-4908-a7fd-28d77d77180b" xsi:nil="true"/>
+    <DocumentTypeHash xmlns="38310968-5489-4908-a7fd-28d77d77180b" xsi:nil="true"/>
+    <p573a9c741dc417bb2ac17c62f0d7fec xmlns="38310968-5489-4908-a7fd-28d77d77180b">
+      <Terms xmlns="http://schemas.microsoft.com/office/infopath/2007/PartnerControls">
+        <TermInfo xmlns="http://schemas.microsoft.com/office/infopath/2007/PartnerControls">
+          <TermName xmlns="http://schemas.microsoft.com/office/infopath/2007/PartnerControls">Global Marketing</TermName>
+          <TermId xmlns="http://schemas.microsoft.com/office/infopath/2007/PartnerControls">e0b710cf-c6d3-43a1-8630-de31700b267e</TermId>
+        </TermInfo>
+      </Terms>
+    </p573a9c741dc417bb2ac17c62f0d7fec>
+    <ContentLanguage xmlns="38310968-5489-4908-a7fd-28d77d77180b">English</ContentLanguage>
+    <a17442c2a02145a2907b3a4e0f07e5a2 xmlns="38310968-5489-4908-a7fd-28d77d77180b">
+      <Terms xmlns="http://schemas.microsoft.com/office/infopath/2007/PartnerControls">
+        <TermInfo xmlns="http://schemas.microsoft.com/office/infopath/2007/PartnerControls">
+          <TermName xmlns="http://schemas.microsoft.com/office/infopath/2007/PartnerControls">All</TermName>
+          <TermId xmlns="http://schemas.microsoft.com/office/infopath/2007/PartnerControls">ff20392c-f58a-4878-bc07-3294c3236521</TermId>
+        </TermInfo>
+      </Terms>
+    </a17442c2a02145a2907b3a4e0f07e5a2>
+    <LegacyDocumentReference xmlns="38310968-5489-4908-a7fd-28d77d77180b" xsi:nil="true"/>
+    <RelatedDocumentReferences xmlns="38310968-5489-4908-a7fd-28d77d77180b">JLR-TMP-58550</RelatedDocumentReferences>
+    <DocumentApproversString xmlns="38310968-5489-4908-a7fd-28d77d77180b" xsi:nil="true"/>
+    <AlsoSeeDocumentReferences xmlns="38310968-5489-4908-a7fd-28d77d77180b">JLR-TMP-58550</AlsoSeeDocumentReferences>
+    <SynchronizationStatus xmlns="38310968-5489-4908-a7fd-28d77d77180b" xsi:nil="true"/>
+    <RelatedDocumentsStatus xmlns="38310968-5489-4908-a7fd-28d77d77180b" xsi:nil="true"/>
+    <jbce69f76f6c458484ca80c299864b6c xmlns="38310968-5489-4908-a7fd-28d77d77180b">
+      <Terms xmlns="http://schemas.microsoft.com/office/infopath/2007/PartnerControls"/>
+    </jbce69f76f6c458484ca80c299864b6c>
+    <WorkingInstructionType xmlns="38310968-5489-4908-a7fd-28d77d77180b">Template</WorkingInstructionType>
+    <SPPGuid xmlns="38310968-5489-4908-a7fd-28d77d77180b" xsi:nil="true"/>
+    <FunctionalAdmin xmlns="38310968-5489-4908-a7fd-28d77d77180b">
+      <UserInfo>
+        <DisplayName/>
+        <AccountId xsi:nil="true"/>
+        <AccountType/>
+      </UserInfo>
+    </FunctionalAdmin>
+    <IsPartial xmlns="f05410ba-fd3c-445a-962b-21c98a03fa26" xsi:nil="true"/>
+    <ReviewWorkflowLastRun xmlns="f05410ba-fd3c-445a-962b-21c98a03fa26" xsi:nil="true"/>
+    <OrgReviewDate xmlns="f05410ba-fd3c-445a-962b-21c98a03fa26" xsi:nil="true"/>
+    <PolicyType xmlns="38310968-5489-4908-a7fd-28d77d77180b">Corporate</PolicyType>
+    <ApprovalWorkflowLastRun xmlns="f05410ba-fd3c-445a-962b-21c98a03fa26" xsi:nil="true"/>
+    <DocumentComments xmlns="38310968-5489-4908-a7fd-28d77d77180b" xsi:nil="true"/>
+  </documentManagement>
+</p:properties>
 </file>
 
 <file path=customXml/item2.xml><?xml version="1.0" encoding="utf-8"?>
@@ -7535,164 +8685,28 @@
 </file>
 
 <file path=customXml/item3.xml><?xml version="1.0" encoding="utf-8"?>
-<p:properties xmlns:p="http://schemas.microsoft.com/office/2006/metadata/properties" xmlns:xsi="http://www.w3.org/2001/XMLSchema-instance" xmlns:pc="http://schemas.microsoft.com/office/infopath/2007/PartnerControls">
-  <documentManagement>
-    <PersistReviewDate xmlns="38310968-5489-4908-a7fd-28d77d77180b">true</PersistReviewDate>
-    <AccessLevels xmlns="38310968-5489-4908-a7fd-28d77d77180b" xsi:nil="true"/>
-    <fa2edfbc4bd54f5daa2bdbccf446cdae xmlns="38310968-5489-4908-a7fd-28d77d77180b">
-      <Terms xmlns="http://schemas.microsoft.com/office/infopath/2007/PartnerControls"/>
-    </fa2edfbc4bd54f5daa2bdbccf446cdae>
-    <DocumentAuthor xmlns="38310968-5489-4908-a7fd-28d77d77180b">
-      <UserInfo>
-        <DisplayName>Hancox, Sophie (S.C.)</DisplayName>
-        <AccountId>49379</AccountId>
-        <AccountType/>
-      </UserInfo>
-    </DocumentAuthor>
-    <DocumentContentOwner xmlns="38310968-5489-4908-a7fd-28d77d77180b">
-      <UserInfo>
-        <DisplayName>Harman, Michelle (M.J.)</DisplayName>
-        <AccountId>13864</AccountId>
-        <AccountType/>
-      </UserInfo>
-    </DocumentContentOwner>
-    <PublishedDocumentUrl xmlns="38310968-5489-4908-a7fd-28d77d77180b">&lt;a href="/sites/jlrway/wi/Documents/Template/JLR%20Template%2016-9.pptx"&gt;JLR Template 16-9.pptx&lt;/a&gt;</PublishedDocumentUrl>
-    <n8842fbf44284d17b0e5de552104aaf7 xmlns="38310968-5489-4908-a7fd-28d77d77180b">
-      <Terms xmlns="http://schemas.microsoft.com/office/infopath/2007/PartnerControls">
-        <TermInfo xmlns="http://schemas.microsoft.com/office/infopath/2007/PartnerControls">
-          <TermName xmlns="http://schemas.microsoft.com/office/infopath/2007/PartnerControls">All</TermName>
-          <TermId xmlns="http://schemas.microsoft.com/office/infopath/2007/PartnerControls">ff20392c-f58a-4878-bc07-3294c3236521</TermId>
-        </TermInfo>
-      </Terms>
-    </n8842fbf44284d17b0e5de552104aaf7>
-    <ReviewDate xmlns="38310968-5489-4908-a7fd-28d77d77180b">2017-06-19T23:00:00+00:00</ReviewDate>
-    <RetentionSuspended xmlns="38310968-5489-4908-a7fd-28d77d77180b">false</RetentionSuspended>
-    <DocumentApprovers xmlns="38310968-5489-4908-a7fd-28d77d77180b">
-      <UserInfo>
-        <DisplayName/>
-        <AccountId xsi:nil="true"/>
-        <AccountType/>
-      </UserInfo>
-    </DocumentApprovers>
-    <DatePublished xmlns="38310968-5489-4908-a7fd-28d77d77180b">2017-03-13T12:26:19+00:00</DatePublished>
-    <cf433fb806414c1d854ab57603b41329 xmlns="38310968-5489-4908-a7fd-28d77d77180b">
-      <Terms xmlns="http://schemas.microsoft.com/office/infopath/2007/PartnerControls">
-        <TermInfo xmlns="http://schemas.microsoft.com/office/infopath/2007/PartnerControls">
-          <TermName xmlns="http://schemas.microsoft.com/office/infopath/2007/PartnerControls">Marketing Sales and Service</TermName>
-          <TermId xmlns="http://schemas.microsoft.com/office/infopath/2007/PartnerControls">3617296b-c237-41b7-9e55-0214083b70db</TermId>
-        </TermInfo>
-      </Terms>
-    </cf433fb806414c1d854ab57603b41329>
-    <of61fea281d5434f8b92ac0a7fa77a43 xmlns="38310968-5489-4908-a7fd-28d77d77180b">
-      <Terms xmlns="http://schemas.microsoft.com/office/infopath/2007/PartnerControls">
-        <TermInfo xmlns="http://schemas.microsoft.com/office/infopath/2007/PartnerControls">
-          <TermName xmlns="http://schemas.microsoft.com/office/infopath/2007/PartnerControls">10. Brand Model Creation and Delivery System</TermName>
-          <TermId xmlns="http://schemas.microsoft.com/office/infopath/2007/PartnerControls">de5707f0-2d77-48b5-bec9-1ea2ad0deed3</TermId>
-        </TermInfo>
-        <TermInfo xmlns="http://schemas.microsoft.com/office/infopath/2007/PartnerControls">
-          <TermName xmlns="http://schemas.microsoft.com/office/infopath/2007/PartnerControls">#10.04 Define Brand Strategy</TermName>
-          <TermId xmlns="http://schemas.microsoft.com/office/infopath/2007/PartnerControls">d698321a-69e2-467e-9ad2-c081f697bce6</TermId>
-        </TermInfo>
-      </Terms>
-    </of61fea281d5434f8b92ac0a7fa77a43>
-    <PublishedVersion xmlns="38310968-5489-4908-a7fd-28d77d77180b">3</PublishedVersion>
-    <WorkingVersion xmlns="38310968-5489-4908-a7fd-28d77d77180b">3</WorkingVersion>
-    <DocumentSummary xmlns="38310968-5489-4908-a7fd-28d77d77180b">JLR Dual Brand PowerPoint Template </DocumentSummary>
-    <DocumentReference xmlns="38310968-5489-4908-a7fd-28d77d77180b">JLR-TMP-58523</DocumentReference>
-    <ApplicableSites xmlns="38310968-5489-4908-a7fd-28d77d77180b">
-      <Value>All UK Sites</Value>
-    </ApplicableSites>
-    <ParentDocumentReference xmlns="38310968-5489-4908-a7fd-28d77d77180b" xsi:nil="true"/>
-    <gb9cd096587b405d8fabe5771bc7e394 xmlns="38310968-5489-4908-a7fd-28d77d77180b">
-      <Terms xmlns="http://schemas.microsoft.com/office/infopath/2007/PartnerControls"/>
-    </gb9cd096587b405d8fabe5771bc7e394>
-    <f8f94e19fc5440d0b83a424959612cbe xmlns="38310968-5489-4908-a7fd-28d77d77180b">
-      <Terms xmlns="http://schemas.microsoft.com/office/infopath/2007/PartnerControls"/>
-    </f8f94e19fc5440d0b83a424959612cbe>
-    <ComplianceStatus xmlns="38310968-5489-4908-a7fd-28d77d77180b">JLR Way compliant</ComplianceStatus>
-    <DocumentStatus xmlns="38310968-5489-4908-a7fd-28d77d77180b">Draft</DocumentStatus>
-    <TaxCatchAll xmlns="38310968-5489-4908-a7fd-28d77d77180b">
-      <Value>648</Value>
-      <Value>647</Value>
-      <Value>438</Value>
-      <Value>1905</Value>
-      <Value>386</Value>
-      <Value>869</Value>
-    </TaxCatchAll>
-    <l5334508f5e044ed9486fe21a075889a xmlns="38310968-5489-4908-a7fd-28d77d77180b">
-      <Terms xmlns="http://schemas.microsoft.com/office/infopath/2007/PartnerControls"/>
-    </l5334508f5e044ed9486fe21a075889a>
-    <DocumentReady xmlns="38310968-5489-4908-a7fd-28d77d77180b">true</DocumentReady>
-    <aa45e664c19f4984ae512c95e2c99bac xmlns="38310968-5489-4908-a7fd-28d77d77180b">
-      <Terms xmlns="http://schemas.microsoft.com/office/infopath/2007/PartnerControls"/>
-    </aa45e664c19f4984ae512c95e2c99bac>
-    <DocumentType xmlns="38310968-5489-4908-a7fd-28d77d77180b" xsi:nil="true"/>
-    <ParentDocument xmlns="38310968-5489-4908-a7fd-28d77d77180b" xsi:nil="true"/>
-    <ContentAudience xmlns="38310968-5489-4908-a7fd-28d77d77180b">
-      <UserInfo>
-        <DisplayName/>
-        <AccountId xsi:nil="true"/>
-        <AccountType/>
-      </UserInfo>
-    </ContentAudience>
-    <DocumentReviewers xmlns="38310968-5489-4908-a7fd-28d77d77180b">
-      <UserInfo>
-        <DisplayName/>
-        <AccountId xsi:nil="true"/>
-        <AccountType/>
-      </UserInfo>
-    </DocumentReviewers>
-    <RetentionDate xmlns="38310968-5489-4908-a7fd-28d77d77180b" xsi:nil="true"/>
-    <DocumentTypeHash xmlns="38310968-5489-4908-a7fd-28d77d77180b" xsi:nil="true"/>
-    <p573a9c741dc417bb2ac17c62f0d7fec xmlns="38310968-5489-4908-a7fd-28d77d77180b">
-      <Terms xmlns="http://schemas.microsoft.com/office/infopath/2007/PartnerControls">
-        <TermInfo xmlns="http://schemas.microsoft.com/office/infopath/2007/PartnerControls">
-          <TermName xmlns="http://schemas.microsoft.com/office/infopath/2007/PartnerControls">Global Marketing</TermName>
-          <TermId xmlns="http://schemas.microsoft.com/office/infopath/2007/PartnerControls">e0b710cf-c6d3-43a1-8630-de31700b267e</TermId>
-        </TermInfo>
-      </Terms>
-    </p573a9c741dc417bb2ac17c62f0d7fec>
-    <ContentLanguage xmlns="38310968-5489-4908-a7fd-28d77d77180b">English</ContentLanguage>
-    <a17442c2a02145a2907b3a4e0f07e5a2 xmlns="38310968-5489-4908-a7fd-28d77d77180b">
-      <Terms xmlns="http://schemas.microsoft.com/office/infopath/2007/PartnerControls">
-        <TermInfo xmlns="http://schemas.microsoft.com/office/infopath/2007/PartnerControls">
-          <TermName xmlns="http://schemas.microsoft.com/office/infopath/2007/PartnerControls">All</TermName>
-          <TermId xmlns="http://schemas.microsoft.com/office/infopath/2007/PartnerControls">ff20392c-f58a-4878-bc07-3294c3236521</TermId>
-        </TermInfo>
-      </Terms>
-    </a17442c2a02145a2907b3a4e0f07e5a2>
-    <LegacyDocumentReference xmlns="38310968-5489-4908-a7fd-28d77d77180b" xsi:nil="true"/>
-    <RelatedDocumentReferences xmlns="38310968-5489-4908-a7fd-28d77d77180b">JLR-TMP-58550</RelatedDocumentReferences>
-    <DocumentApproversString xmlns="38310968-5489-4908-a7fd-28d77d77180b" xsi:nil="true"/>
-    <AlsoSeeDocumentReferences xmlns="38310968-5489-4908-a7fd-28d77d77180b">JLR-TMP-58550</AlsoSeeDocumentReferences>
-    <SynchronizationStatus xmlns="38310968-5489-4908-a7fd-28d77d77180b" xsi:nil="true"/>
-    <RelatedDocumentsStatus xmlns="38310968-5489-4908-a7fd-28d77d77180b" xsi:nil="true"/>
-    <jbce69f76f6c458484ca80c299864b6c xmlns="38310968-5489-4908-a7fd-28d77d77180b">
-      <Terms xmlns="http://schemas.microsoft.com/office/infopath/2007/PartnerControls"/>
-    </jbce69f76f6c458484ca80c299864b6c>
-    <WorkingInstructionType xmlns="38310968-5489-4908-a7fd-28d77d77180b">Template</WorkingInstructionType>
-    <SPPGuid xmlns="38310968-5489-4908-a7fd-28d77d77180b" xsi:nil="true"/>
-    <FunctionalAdmin xmlns="38310968-5489-4908-a7fd-28d77d77180b">
-      <UserInfo>
-        <DisplayName/>
-        <AccountId xsi:nil="true"/>
-        <AccountType/>
-      </UserInfo>
-    </FunctionalAdmin>
-    <IsPartial xmlns="f05410ba-fd3c-445a-962b-21c98a03fa26" xsi:nil="true"/>
-    <ReviewWorkflowLastRun xmlns="f05410ba-fd3c-445a-962b-21c98a03fa26" xsi:nil="true"/>
-    <OrgReviewDate xmlns="f05410ba-fd3c-445a-962b-21c98a03fa26" xsi:nil="true"/>
-    <PolicyType xmlns="38310968-5489-4908-a7fd-28d77d77180b">Corporate</PolicyType>
-    <ApprovalWorkflowLastRun xmlns="f05410ba-fd3c-445a-962b-21c98a03fa26" xsi:nil="true"/>
-    <DocumentComments xmlns="38310968-5489-4908-a7fd-28d77d77180b" xsi:nil="true"/>
-  </documentManagement>
-</p:properties>
+<?mso-contentType ?>
+<FormTemplates xmlns="http://schemas.microsoft.com/sharepoint/v3/contenttype/forms">
+  <Display>DocumentLibraryForm</Display>
+  <Edit>DocumentLibraryForm</Edit>
+  <New>DocumentLibraryForm</New>
+</FormTemplates>
 </file>
 
 <file path=customXml/itemProps1.xml><?xml version="1.0" encoding="utf-8"?>
-<ds:datastoreItem xmlns:ds="http://schemas.openxmlformats.org/officeDocument/2006/customXml" ds:itemID="{4D0ABABE-9BF8-409B-A5D7-1165E736313C}">
+<ds:datastoreItem xmlns:ds="http://schemas.openxmlformats.org/officeDocument/2006/customXml" ds:itemID="{8E2AB686-E47F-49C9-80E6-51BB2E5C00EB}">
   <ds:schemaRefs>
-    <ds:schemaRef ds:uri="http://schemas.microsoft.com/sharepoint/v3/contenttype/forms"/>
+    <ds:schemaRef ds:uri="http://schemas.microsoft.com/office/2006/metadata/properties"/>
+    <ds:schemaRef ds:uri="http://schemas.openxmlformats.org/package/2006/metadata/core-properties"/>
+    <ds:schemaRef ds:uri="http://schemas.microsoft.com/office/infopath/2007/PartnerControls"/>
+    <ds:schemaRef ds:uri="http://purl.org/dc/elements/1.1/"/>
+    <ds:schemaRef ds:uri="http://www.w3.org/XML/1998/namespace"/>
+    <ds:schemaRef ds:uri="http://purl.org/dc/terms/"/>
+    <ds:schemaRef ds:uri="38310968-5489-4908-a7fd-28d77d77180b"/>
+    <ds:schemaRef ds:uri="http://purl.org/dc/dcmitype/"/>
+    <ds:schemaRef ds:uri="http://schemas.microsoft.com/office/2006/documentManagement/types"/>
+    <ds:schemaRef ds:uri="http://schemas.microsoft.com/sharepoint/v3/fields"/>
+    <ds:schemaRef ds:uri="f05410ba-fd3c-445a-962b-21c98a03fa26"/>
   </ds:schemaRefs>
 </ds:datastoreItem>
 </file>
@@ -7718,19 +8732,9 @@
 </file>
 
 <file path=customXml/itemProps3.xml><?xml version="1.0" encoding="utf-8"?>
-<ds:datastoreItem xmlns:ds="http://schemas.openxmlformats.org/officeDocument/2006/customXml" ds:itemID="{8E2AB686-E47F-49C9-80E6-51BB2E5C00EB}">
+<ds:datastoreItem xmlns:ds="http://schemas.openxmlformats.org/officeDocument/2006/customXml" ds:itemID="{4D0ABABE-9BF8-409B-A5D7-1165E736313C}">
   <ds:schemaRefs>
-    <ds:schemaRef ds:uri="http://schemas.microsoft.com/office/2006/metadata/properties"/>
-    <ds:schemaRef ds:uri="http://schemas.openxmlformats.org/package/2006/metadata/core-properties"/>
-    <ds:schemaRef ds:uri="http://schemas.microsoft.com/office/infopath/2007/PartnerControls"/>
-    <ds:schemaRef ds:uri="http://purl.org/dc/elements/1.1/"/>
-    <ds:schemaRef ds:uri="http://www.w3.org/XML/1998/namespace"/>
-    <ds:schemaRef ds:uri="http://purl.org/dc/terms/"/>
-    <ds:schemaRef ds:uri="38310968-5489-4908-a7fd-28d77d77180b"/>
-    <ds:schemaRef ds:uri="http://purl.org/dc/dcmitype/"/>
-    <ds:schemaRef ds:uri="http://schemas.microsoft.com/office/2006/documentManagement/types"/>
-    <ds:schemaRef ds:uri="http://schemas.microsoft.com/sharepoint/v3/fields"/>
-    <ds:schemaRef ds:uri="f05410ba-fd3c-445a-962b-21c98a03fa26"/>
+    <ds:schemaRef ds:uri="http://schemas.microsoft.com/sharepoint/v3/contenttype/forms"/>
   </ds:schemaRefs>
 </ds:datastoreItem>
 </file>
</xml_diff>